<commit_message>
boceto de todas las diapositivas con informacion
</commit_message>
<xml_diff>
--- a/presentacion/Presentació1.pptx
+++ b/presentacion/Presentació1.pptx
@@ -9,6 +9,27 @@
     <p:sldId id="257" r:id="rId3"/>
     <p:sldId id="258" r:id="rId4"/>
     <p:sldId id="259" r:id="rId5"/>
+    <p:sldId id="260" r:id="rId6"/>
+    <p:sldId id="261" r:id="rId7"/>
+    <p:sldId id="262" r:id="rId8"/>
+    <p:sldId id="263" r:id="rId9"/>
+    <p:sldId id="264" r:id="rId10"/>
+    <p:sldId id="267" r:id="rId11"/>
+    <p:sldId id="268" r:id="rId12"/>
+    <p:sldId id="269" r:id="rId13"/>
+    <p:sldId id="270" r:id="rId14"/>
+    <p:sldId id="265" r:id="rId15"/>
+    <p:sldId id="271" r:id="rId16"/>
+    <p:sldId id="272" r:id="rId17"/>
+    <p:sldId id="273" r:id="rId18"/>
+    <p:sldId id="266" r:id="rId19"/>
+    <p:sldId id="274" r:id="rId20"/>
+    <p:sldId id="275" r:id="rId21"/>
+    <p:sldId id="276" r:id="rId22"/>
+    <p:sldId id="277" r:id="rId23"/>
+    <p:sldId id="278" r:id="rId24"/>
+    <p:sldId id="279" r:id="rId25"/>
+    <p:sldId id="280" r:id="rId26"/>
   </p:sldIdLst>
   <p:sldSz cx="12192000" cy="6858000"/>
   <p:notesSz cx="6858000" cy="9144000"/>
@@ -262,7 +283,7 @@
           <a:p>
             <a:fld id="{C947F3CF-587E-45B4-8FCF-EDFCE467AEF1}" type="datetimeFigureOut">
               <a:rPr lang="es-ES" smtClean="0"/>
-              <a:t>22/02/2018</a:t>
+              <a:t>23/02/2018</a:t>
             </a:fld>
             <a:endParaRPr lang="es-ES"/>
           </a:p>
@@ -460,7 +481,7 @@
           <a:p>
             <a:fld id="{C947F3CF-587E-45B4-8FCF-EDFCE467AEF1}" type="datetimeFigureOut">
               <a:rPr lang="es-ES" smtClean="0"/>
-              <a:t>22/02/2018</a:t>
+              <a:t>23/02/2018</a:t>
             </a:fld>
             <a:endParaRPr lang="es-ES"/>
           </a:p>
@@ -668,7 +689,7 @@
           <a:p>
             <a:fld id="{C947F3CF-587E-45B4-8FCF-EDFCE467AEF1}" type="datetimeFigureOut">
               <a:rPr lang="es-ES" smtClean="0"/>
-              <a:t>22/02/2018</a:t>
+              <a:t>23/02/2018</a:t>
             </a:fld>
             <a:endParaRPr lang="es-ES"/>
           </a:p>
@@ -866,7 +887,7 @@
           <a:p>
             <a:fld id="{C947F3CF-587E-45B4-8FCF-EDFCE467AEF1}" type="datetimeFigureOut">
               <a:rPr lang="es-ES" smtClean="0"/>
-              <a:t>22/02/2018</a:t>
+              <a:t>23/02/2018</a:t>
             </a:fld>
             <a:endParaRPr lang="es-ES"/>
           </a:p>
@@ -1141,7 +1162,7 @@
           <a:p>
             <a:fld id="{C947F3CF-587E-45B4-8FCF-EDFCE467AEF1}" type="datetimeFigureOut">
               <a:rPr lang="es-ES" smtClean="0"/>
-              <a:t>22/02/2018</a:t>
+              <a:t>23/02/2018</a:t>
             </a:fld>
             <a:endParaRPr lang="es-ES"/>
           </a:p>
@@ -1406,7 +1427,7 @@
           <a:p>
             <a:fld id="{C947F3CF-587E-45B4-8FCF-EDFCE467AEF1}" type="datetimeFigureOut">
               <a:rPr lang="es-ES" smtClean="0"/>
-              <a:t>22/02/2018</a:t>
+              <a:t>23/02/2018</a:t>
             </a:fld>
             <a:endParaRPr lang="es-ES"/>
           </a:p>
@@ -1818,7 +1839,7 @@
           <a:p>
             <a:fld id="{C947F3CF-587E-45B4-8FCF-EDFCE467AEF1}" type="datetimeFigureOut">
               <a:rPr lang="es-ES" smtClean="0"/>
-              <a:t>22/02/2018</a:t>
+              <a:t>23/02/2018</a:t>
             </a:fld>
             <a:endParaRPr lang="es-ES"/>
           </a:p>
@@ -1959,7 +1980,7 @@
           <a:p>
             <a:fld id="{C947F3CF-587E-45B4-8FCF-EDFCE467AEF1}" type="datetimeFigureOut">
               <a:rPr lang="es-ES" smtClean="0"/>
-              <a:t>22/02/2018</a:t>
+              <a:t>23/02/2018</a:t>
             </a:fld>
             <a:endParaRPr lang="es-ES"/>
           </a:p>
@@ -2072,7 +2093,7 @@
           <a:p>
             <a:fld id="{C947F3CF-587E-45B4-8FCF-EDFCE467AEF1}" type="datetimeFigureOut">
               <a:rPr lang="es-ES" smtClean="0"/>
-              <a:t>22/02/2018</a:t>
+              <a:t>23/02/2018</a:t>
             </a:fld>
             <a:endParaRPr lang="es-ES"/>
           </a:p>
@@ -2383,7 +2404,7 @@
           <a:p>
             <a:fld id="{C947F3CF-587E-45B4-8FCF-EDFCE467AEF1}" type="datetimeFigureOut">
               <a:rPr lang="es-ES" smtClean="0"/>
-              <a:t>22/02/2018</a:t>
+              <a:t>23/02/2018</a:t>
             </a:fld>
             <a:endParaRPr lang="es-ES"/>
           </a:p>
@@ -2671,7 +2692,7 @@
           <a:p>
             <a:fld id="{C947F3CF-587E-45B4-8FCF-EDFCE467AEF1}" type="datetimeFigureOut">
               <a:rPr lang="es-ES" smtClean="0"/>
-              <a:t>22/02/2018</a:t>
+              <a:t>23/02/2018</a:t>
             </a:fld>
             <a:endParaRPr lang="es-ES"/>
           </a:p>
@@ -2912,7 +2933,7 @@
           <a:p>
             <a:fld id="{C947F3CF-587E-45B4-8FCF-EDFCE467AEF1}" type="datetimeFigureOut">
               <a:rPr lang="es-ES" smtClean="0"/>
-              <a:t>22/02/2018</a:t>
+              <a:t>23/02/2018</a:t>
             </a:fld>
             <a:endParaRPr lang="es-ES"/>
           </a:p>
@@ -3407,7 +3428,7 @@
         </p:nvSpPr>
         <p:spPr>
           <a:xfrm>
-            <a:off x="3003258" y="4412609"/>
+            <a:off x="3003256" y="5221774"/>
             <a:ext cx="6185483" cy="646331"/>
           </a:xfrm>
           <a:prstGeom prst="rect">
@@ -3426,17 +3447,12 @@
               <a:rPr lang="es-ES" dirty="0"/>
               <a:t>Trabajo de Fin de Grado para acceder al </a:t>
             </a:r>
-            <a:endParaRPr lang="es-ES" dirty="0" smtClean="0"/>
           </a:p>
           <a:p>
             <a:pPr algn="ctr"/>
             <a:r>
-              <a:rPr lang="es-ES" dirty="0" smtClean="0"/>
-              <a:t>GRADO </a:t>
-            </a:r>
-            <a:r>
-              <a:rPr lang="es-ES" dirty="0"/>
-              <a:t>EN INGENIERÍA INFORMÁTICA </a:t>
+              <a:rPr lang="es-ES" dirty="0"/>
+              <a:t>GRADO EN INGENIERÍA INFORMÁTICA </a:t>
             </a:r>
           </a:p>
         </p:txBody>
@@ -3455,8 +3471,8 @@
         </p:nvSpPr>
         <p:spPr>
           <a:xfrm>
-            <a:off x="8347046" y="5327388"/>
-            <a:ext cx="3598877" cy="1477328"/>
+            <a:off x="8397380" y="5612916"/>
+            <a:ext cx="3548543" cy="1200329"/>
           </a:xfrm>
           <a:prstGeom prst="rect">
             <a:avLst/>
@@ -3469,18 +3485,21 @@
           </a:bodyPr>
           <a:lstStyle/>
           <a:p>
-            <a:r>
-              <a:rPr lang="es-ES" dirty="0"/>
-              <a:t>Autor: Ignacio Agüero Salcines Director: Pablo Sánchez Barreiro </a:t>
-            </a:r>
-          </a:p>
-          <a:p>
+            <a:pPr algn="r"/>
+            <a:r>
+              <a:rPr lang="es-ES" dirty="0"/>
+              <a:t>Director: Pablo Sánchez Barreiro </a:t>
+            </a:r>
+          </a:p>
+          <a:p>
+            <a:pPr algn="r"/>
             <a:r>
               <a:rPr lang="es-ES" dirty="0"/>
               <a:t>Co-Director: Sergio Herrera Iglesias</a:t>
             </a:r>
           </a:p>
           <a:p>
+            <a:pPr algn="r"/>
             <a:endParaRPr lang="es-ES" dirty="0"/>
           </a:p>
           <a:p>
@@ -3488,6 +3507,102 @@
             <a:r>
               <a:rPr lang="es-ES" dirty="0"/>
               <a:t>Febrero - 2018</a:t>
+            </a:r>
+          </a:p>
+        </p:txBody>
+      </p:sp>
+      <p:pic>
+        <p:nvPicPr>
+          <p:cNvPr id="1026" name="Picture 2" descr="logoUnicanGrande">
+            <a:extLst>
+              <a:ext uri="{FF2B5EF4-FFF2-40B4-BE49-F238E27FC236}">
+                <a16:creationId xmlns:a16="http://schemas.microsoft.com/office/drawing/2014/main" id="{A20B10F4-8E1E-4050-A683-78E51C13D792}"/>
+              </a:ext>
+            </a:extLst>
+          </p:cNvPr>
+          <p:cNvPicPr>
+            <a:picLocks noChangeAspect="1" noChangeArrowheads="1"/>
+          </p:cNvPicPr>
+          <p:nvPr/>
+        </p:nvPicPr>
+        <p:blipFill>
+          <a:blip r:embed="rId2">
+            <a:extLst>
+              <a:ext uri="{28A0092B-C50C-407E-A947-70E740481C1C}">
+                <a14:useLocalDpi xmlns:a14="http://schemas.microsoft.com/office/drawing/2010/main" val="0"/>
+              </a:ext>
+            </a:extLst>
+          </a:blip>
+          <a:srcRect/>
+          <a:stretch>
+            <a:fillRect/>
+          </a:stretch>
+        </p:blipFill>
+        <p:spPr bwMode="auto">
+          <a:xfrm>
+            <a:off x="452633" y="340665"/>
+            <a:ext cx="1170894" cy="1189189"/>
+          </a:xfrm>
+          <a:prstGeom prst="rect">
+            <a:avLst/>
+          </a:prstGeom>
+          <a:noFill/>
+          <a:ln>
+            <a:noFill/>
+          </a:ln>
+          <a:extLst>
+            <a:ext uri="{909E8E84-426E-40DD-AFC4-6F175D3DCCD1}">
+              <a14:hiddenFill xmlns:a14="http://schemas.microsoft.com/office/drawing/2010/main">
+                <a:solidFill>
+                  <a:srgbClr val="FFFFFF"/>
+                </a:solidFill>
+              </a14:hiddenFill>
+            </a:ext>
+            <a:ext uri="{91240B29-F687-4F45-9708-019B960494DF}">
+              <a14:hiddenLine xmlns:a14="http://schemas.microsoft.com/office/drawing/2010/main" w="9525">
+                <a:solidFill>
+                  <a:srgbClr val="000000"/>
+                </a:solidFill>
+                <a:miter lim="800000"/>
+                <a:headEnd/>
+                <a:tailEnd/>
+              </a14:hiddenLine>
+            </a:ext>
+          </a:extLst>
+        </p:spPr>
+      </p:pic>
+      <p:sp>
+        <p:nvSpPr>
+          <p:cNvPr id="6" name="CuadroTexto 5">
+            <a:extLst>
+              <a:ext uri="{FF2B5EF4-FFF2-40B4-BE49-F238E27FC236}">
+                <a16:creationId xmlns:a16="http://schemas.microsoft.com/office/drawing/2014/main" id="{F5CB8703-6102-40EF-9171-295569622943}"/>
+              </a:ext>
+            </a:extLst>
+          </p:cNvPr>
+          <p:cNvSpPr txBox="1"/>
+          <p:nvPr/>
+        </p:nvSpPr>
+        <p:spPr>
+          <a:xfrm>
+            <a:off x="3865223" y="4325966"/>
+            <a:ext cx="4461547" cy="523220"/>
+          </a:xfrm>
+          <a:prstGeom prst="rect">
+            <a:avLst/>
+          </a:prstGeom>
+          <a:noFill/>
+        </p:spPr>
+        <p:txBody>
+          <a:bodyPr wrap="square" rtlCol="0">
+            <a:spAutoFit/>
+          </a:bodyPr>
+          <a:lstStyle/>
+          <a:p>
+            <a:pPr algn="ctr"/>
+            <a:r>
+              <a:rPr lang="es-ES" sz="2800" dirty="0"/>
+              <a:t>Ignacio Agüero Salcines</a:t>
             </a:r>
           </a:p>
         </p:txBody>
@@ -3496,6 +3611,1055 @@
     <p:extLst>
       <p:ext uri="{BB962C8B-B14F-4D97-AF65-F5344CB8AC3E}">
         <p14:creationId xmlns:p14="http://schemas.microsoft.com/office/powerpoint/2010/main" val="3406253265"/>
+      </p:ext>
+    </p:extLst>
+  </p:cSld>
+  <p:clrMapOvr>
+    <a:masterClrMapping/>
+  </p:clrMapOvr>
+</p:sld>
+</file>
+
+<file path=ppt/slides/slide10.xml><?xml version="1.0" encoding="utf-8"?>
+<p:sld xmlns:a="http://schemas.openxmlformats.org/drawingml/2006/main" xmlns:r="http://schemas.openxmlformats.org/officeDocument/2006/relationships" xmlns:p="http://schemas.openxmlformats.org/presentationml/2006/main">
+  <p:cSld>
+    <p:spTree>
+      <p:nvGrpSpPr>
+        <p:cNvPr id="1" name=""/>
+        <p:cNvGrpSpPr/>
+        <p:nvPr/>
+      </p:nvGrpSpPr>
+      <p:grpSpPr>
+        <a:xfrm>
+          <a:off x="0" y="0"/>
+          <a:ext cx="0" cy="0"/>
+          <a:chOff x="0" y="0"/>
+          <a:chExt cx="0" cy="0"/>
+        </a:xfrm>
+      </p:grpSpPr>
+      <p:sp>
+        <p:nvSpPr>
+          <p:cNvPr id="2" name="Título 1">
+            <a:extLst>
+              <a:ext uri="{FF2B5EF4-FFF2-40B4-BE49-F238E27FC236}">
+                <a16:creationId xmlns:a16="http://schemas.microsoft.com/office/drawing/2014/main" id="{BA8F0714-9E61-4D6D-9AB4-14A5CBB5EAE8}"/>
+              </a:ext>
+            </a:extLst>
+          </p:cNvPr>
+          <p:cNvSpPr>
+            <a:spLocks noGrp="1"/>
+          </p:cNvSpPr>
+          <p:nvPr>
+            <p:ph type="title"/>
+          </p:nvPr>
+        </p:nvSpPr>
+        <p:spPr/>
+        <p:txBody>
+          <a:bodyPr/>
+          <a:lstStyle/>
+          <a:p>
+            <a:r>
+              <a:rPr lang="es-ES" dirty="0"/>
+              <a:t>Metodología</a:t>
+            </a:r>
+          </a:p>
+        </p:txBody>
+      </p:sp>
+      <p:sp>
+        <p:nvSpPr>
+          <p:cNvPr id="3" name="Marcador de contenido 2">
+            <a:extLst>
+              <a:ext uri="{FF2B5EF4-FFF2-40B4-BE49-F238E27FC236}">
+                <a16:creationId xmlns:a16="http://schemas.microsoft.com/office/drawing/2014/main" id="{CD4F1223-92C2-43E8-A6F6-CAD399298BFF}"/>
+              </a:ext>
+            </a:extLst>
+          </p:cNvPr>
+          <p:cNvSpPr>
+            <a:spLocks noGrp="1"/>
+          </p:cNvSpPr>
+          <p:nvPr>
+            <p:ph idx="1"/>
+          </p:nvPr>
+        </p:nvSpPr>
+        <p:spPr/>
+        <p:txBody>
+          <a:bodyPr/>
+          <a:lstStyle/>
+          <a:p>
+            <a:r>
+              <a:rPr lang="es-ES" dirty="0"/>
+              <a:t>Iterativa</a:t>
+            </a:r>
+          </a:p>
+          <a:p>
+            <a:r>
+              <a:rPr lang="es-ES" dirty="0"/>
+              <a:t>Basada en principios ágiles</a:t>
+            </a:r>
+          </a:p>
+          <a:p>
+            <a:pPr lvl="1"/>
+            <a:r>
+              <a:rPr lang="es-ES" dirty="0"/>
+              <a:t>Existencia de un </a:t>
+            </a:r>
+            <a:r>
+              <a:rPr lang="es-ES" i="1" dirty="0" err="1"/>
+              <a:t>Product</a:t>
+            </a:r>
+            <a:r>
+              <a:rPr lang="es-ES" i="1" dirty="0"/>
+              <a:t> Backlog</a:t>
+            </a:r>
+          </a:p>
+          <a:p>
+            <a:pPr lvl="1"/>
+            <a:r>
+              <a:rPr lang="es-ES" dirty="0"/>
+              <a:t>Seguimiento del avance del proyecto</a:t>
+            </a:r>
+          </a:p>
+          <a:p>
+            <a:pPr lvl="1"/>
+            <a:r>
+              <a:rPr lang="es-ES" i="1" dirty="0" err="1"/>
+              <a:t>Product</a:t>
+            </a:r>
+            <a:r>
+              <a:rPr lang="es-ES" i="1" dirty="0"/>
+              <a:t> </a:t>
+            </a:r>
+            <a:r>
+              <a:rPr lang="es-ES" i="1" dirty="0" err="1"/>
+              <a:t>Owner</a:t>
+            </a:r>
+            <a:r>
+              <a:rPr lang="es-ES" i="1" dirty="0"/>
+              <a:t> </a:t>
+            </a:r>
+            <a:r>
+              <a:rPr lang="es-ES" dirty="0"/>
+              <a:t>Informado</a:t>
+            </a:r>
+          </a:p>
+        </p:txBody>
+      </p:sp>
+    </p:spTree>
+    <p:extLst>
+      <p:ext uri="{BB962C8B-B14F-4D97-AF65-F5344CB8AC3E}">
+        <p14:creationId xmlns:p14="http://schemas.microsoft.com/office/powerpoint/2010/main" val="2785391580"/>
+      </p:ext>
+    </p:extLst>
+  </p:cSld>
+  <p:clrMapOvr>
+    <a:masterClrMapping/>
+  </p:clrMapOvr>
+</p:sld>
+</file>
+
+<file path=ppt/slides/slide11.xml><?xml version="1.0" encoding="utf-8"?>
+<p:sld xmlns:a="http://schemas.openxmlformats.org/drawingml/2006/main" xmlns:r="http://schemas.openxmlformats.org/officeDocument/2006/relationships" xmlns:p="http://schemas.openxmlformats.org/presentationml/2006/main">
+  <p:cSld>
+    <p:spTree>
+      <p:nvGrpSpPr>
+        <p:cNvPr id="1" name=""/>
+        <p:cNvGrpSpPr/>
+        <p:nvPr/>
+      </p:nvGrpSpPr>
+      <p:grpSpPr>
+        <a:xfrm>
+          <a:off x="0" y="0"/>
+          <a:ext cx="0" cy="0"/>
+          <a:chOff x="0" y="0"/>
+          <a:chExt cx="0" cy="0"/>
+        </a:xfrm>
+      </p:grpSpPr>
+      <p:sp>
+        <p:nvSpPr>
+          <p:cNvPr id="2" name="Título 1">
+            <a:extLst>
+              <a:ext uri="{FF2B5EF4-FFF2-40B4-BE49-F238E27FC236}">
+                <a16:creationId xmlns:a16="http://schemas.microsoft.com/office/drawing/2014/main" id="{0725318E-9C86-42B5-80BC-93A2AB7AAB84}"/>
+              </a:ext>
+            </a:extLst>
+          </p:cNvPr>
+          <p:cNvSpPr>
+            <a:spLocks noGrp="1"/>
+          </p:cNvSpPr>
+          <p:nvPr>
+            <p:ph type="title"/>
+          </p:nvPr>
+        </p:nvSpPr>
+        <p:spPr/>
+        <p:txBody>
+          <a:bodyPr/>
+          <a:lstStyle/>
+          <a:p>
+            <a:r>
+              <a:rPr lang="es-ES" dirty="0"/>
+              <a:t>Editor Gráfico</a:t>
+            </a:r>
+          </a:p>
+        </p:txBody>
+      </p:sp>
+      <p:sp>
+        <p:nvSpPr>
+          <p:cNvPr id="3" name="Marcador de contenido 2">
+            <a:extLst>
+              <a:ext uri="{FF2B5EF4-FFF2-40B4-BE49-F238E27FC236}">
+                <a16:creationId xmlns:a16="http://schemas.microsoft.com/office/drawing/2014/main" id="{10223A1E-28A3-45E8-B478-945E59E15A17}"/>
+              </a:ext>
+            </a:extLst>
+          </p:cNvPr>
+          <p:cNvSpPr>
+            <a:spLocks noGrp="1"/>
+          </p:cNvSpPr>
+          <p:nvPr>
+            <p:ph idx="1"/>
+          </p:nvPr>
+        </p:nvSpPr>
+        <p:spPr/>
+        <p:txBody>
+          <a:bodyPr/>
+          <a:lstStyle/>
+          <a:p>
+            <a:r>
+              <a:rPr lang="es-ES" dirty="0"/>
+              <a:t>Implementado en </a:t>
+            </a:r>
+            <a:r>
+              <a:rPr lang="es-ES" i="1" dirty="0" err="1"/>
+              <a:t>GoJS</a:t>
+            </a:r>
+            <a:r>
+              <a:rPr lang="es-ES" i="1" dirty="0"/>
+              <a:t>: </a:t>
+            </a:r>
+            <a:r>
+              <a:rPr lang="es-ES" dirty="0"/>
+              <a:t>biblioteca de JavaScript para implementar editores gráficos dentro de interfaces web</a:t>
+            </a:r>
+          </a:p>
+          <a:p>
+            <a:r>
+              <a:rPr lang="es-ES" dirty="0"/>
+              <a:t>Permite componer una lógica interna compleja.</a:t>
+            </a:r>
+          </a:p>
+          <a:p>
+            <a:r>
+              <a:rPr lang="es-ES" dirty="0"/>
+              <a:t>En ocasiones hubo que modificar el comportamiento por defecto.</a:t>
+            </a:r>
+          </a:p>
+        </p:txBody>
+      </p:sp>
+    </p:spTree>
+    <p:extLst>
+      <p:ext uri="{BB962C8B-B14F-4D97-AF65-F5344CB8AC3E}">
+        <p14:creationId xmlns:p14="http://schemas.microsoft.com/office/powerpoint/2010/main" val="39726469"/>
+      </p:ext>
+    </p:extLst>
+  </p:cSld>
+  <p:clrMapOvr>
+    <a:masterClrMapping/>
+  </p:clrMapOvr>
+</p:sld>
+</file>
+
+<file path=ppt/slides/slide12.xml><?xml version="1.0" encoding="utf-8"?>
+<p:sld xmlns:a="http://schemas.openxmlformats.org/drawingml/2006/main" xmlns:r="http://schemas.openxmlformats.org/officeDocument/2006/relationships" xmlns:p="http://schemas.openxmlformats.org/presentationml/2006/main">
+  <p:cSld>
+    <p:spTree>
+      <p:nvGrpSpPr>
+        <p:cNvPr id="1" name=""/>
+        <p:cNvGrpSpPr/>
+        <p:nvPr/>
+      </p:nvGrpSpPr>
+      <p:grpSpPr>
+        <a:xfrm>
+          <a:off x="0" y="0"/>
+          <a:ext cx="0" cy="0"/>
+          <a:chOff x="0" y="0"/>
+          <a:chExt cx="0" cy="0"/>
+        </a:xfrm>
+      </p:grpSpPr>
+      <p:sp>
+        <p:nvSpPr>
+          <p:cNvPr id="2" name="Título 1">
+            <a:extLst>
+              <a:ext uri="{FF2B5EF4-FFF2-40B4-BE49-F238E27FC236}">
+                <a16:creationId xmlns:a16="http://schemas.microsoft.com/office/drawing/2014/main" id="{18E4AA2C-AA10-47DF-AB1F-6068109AD8BE}"/>
+              </a:ext>
+            </a:extLst>
+          </p:cNvPr>
+          <p:cNvSpPr>
+            <a:spLocks noGrp="1"/>
+          </p:cNvSpPr>
+          <p:nvPr>
+            <p:ph type="title"/>
+          </p:nvPr>
+        </p:nvSpPr>
+        <p:spPr/>
+        <p:txBody>
+          <a:bodyPr/>
+          <a:lstStyle/>
+          <a:p>
+            <a:r>
+              <a:rPr lang="es-ES" dirty="0"/>
+              <a:t>Conector </a:t>
+            </a:r>
+            <a:r>
+              <a:rPr lang="es-ES" dirty="0" err="1"/>
+              <a:t>Javascript</a:t>
+            </a:r>
+            <a:endParaRPr lang="es-ES" dirty="0"/>
+          </a:p>
+        </p:txBody>
+      </p:sp>
+      <p:sp>
+        <p:nvSpPr>
+          <p:cNvPr id="3" name="Marcador de contenido 2">
+            <a:extLst>
+              <a:ext uri="{FF2B5EF4-FFF2-40B4-BE49-F238E27FC236}">
+                <a16:creationId xmlns:a16="http://schemas.microsoft.com/office/drawing/2014/main" id="{7A7AA2AA-7799-40E8-A64F-7EFAB579636C}"/>
+              </a:ext>
+            </a:extLst>
+          </p:cNvPr>
+          <p:cNvSpPr>
+            <a:spLocks noGrp="1"/>
+          </p:cNvSpPr>
+          <p:nvPr>
+            <p:ph idx="1"/>
+          </p:nvPr>
+        </p:nvSpPr>
+        <p:spPr/>
+        <p:txBody>
+          <a:bodyPr/>
+          <a:lstStyle/>
+          <a:p>
+            <a:r>
+              <a:rPr lang="es-ES" dirty="0"/>
+              <a:t>Sirve de enlace entre la herramienta gráfica y un proyecto </a:t>
+            </a:r>
+            <a:r>
+              <a:rPr lang="es-ES" dirty="0" err="1"/>
+              <a:t>Vaadin</a:t>
+            </a:r>
+            <a:r>
+              <a:rPr lang="es-ES" dirty="0"/>
+              <a:t> implementado en Java.</a:t>
+            </a:r>
+          </a:p>
+          <a:p>
+            <a:r>
+              <a:rPr lang="es-ES" dirty="0"/>
+              <a:t>Comunica eventos ocurridos en el Editor Gráfico al proyecto Java.</a:t>
+            </a:r>
+          </a:p>
+          <a:p>
+            <a:r>
+              <a:rPr lang="es-ES" dirty="0"/>
+              <a:t>Envía órdenes desde el proyecto Java al Editor Gráfico.</a:t>
+            </a:r>
+          </a:p>
+          <a:p>
+            <a:r>
+              <a:rPr lang="es-ES" dirty="0"/>
+              <a:t>Fue necesaria la modificación por defecto de la creación de enlaces.</a:t>
+            </a:r>
+          </a:p>
+        </p:txBody>
+      </p:sp>
+    </p:spTree>
+    <p:extLst>
+      <p:ext uri="{BB962C8B-B14F-4D97-AF65-F5344CB8AC3E}">
+        <p14:creationId xmlns:p14="http://schemas.microsoft.com/office/powerpoint/2010/main" val="1076754476"/>
+      </p:ext>
+    </p:extLst>
+  </p:cSld>
+  <p:clrMapOvr>
+    <a:masterClrMapping/>
+  </p:clrMapOvr>
+</p:sld>
+</file>
+
+<file path=ppt/slides/slide13.xml><?xml version="1.0" encoding="utf-8"?>
+<p:sld xmlns:a="http://schemas.openxmlformats.org/drawingml/2006/main" xmlns:r="http://schemas.openxmlformats.org/officeDocument/2006/relationships" xmlns:p="http://schemas.openxmlformats.org/presentationml/2006/main">
+  <p:cSld>
+    <p:spTree>
+      <p:nvGrpSpPr>
+        <p:cNvPr id="1" name=""/>
+        <p:cNvGrpSpPr/>
+        <p:nvPr/>
+      </p:nvGrpSpPr>
+      <p:grpSpPr>
+        <a:xfrm>
+          <a:off x="0" y="0"/>
+          <a:ext cx="0" cy="0"/>
+          <a:chOff x="0" y="0"/>
+          <a:chExt cx="0" cy="0"/>
+        </a:xfrm>
+      </p:grpSpPr>
+      <p:sp>
+        <p:nvSpPr>
+          <p:cNvPr id="2" name="Título 1">
+            <a:extLst>
+              <a:ext uri="{FF2B5EF4-FFF2-40B4-BE49-F238E27FC236}">
+                <a16:creationId xmlns:a16="http://schemas.microsoft.com/office/drawing/2014/main" id="{645AD0F5-D431-4CF0-9AA4-E918520114D6}"/>
+              </a:ext>
+            </a:extLst>
+          </p:cNvPr>
+          <p:cNvSpPr>
+            <a:spLocks noGrp="1"/>
+          </p:cNvSpPr>
+          <p:nvPr>
+            <p:ph type="title"/>
+          </p:nvPr>
+        </p:nvSpPr>
+        <p:spPr/>
+        <p:txBody>
+          <a:bodyPr/>
+          <a:lstStyle/>
+          <a:p>
+            <a:r>
+              <a:rPr lang="es-ES" dirty="0"/>
+              <a:t>Integración </a:t>
+            </a:r>
+            <a:r>
+              <a:rPr lang="es-ES" dirty="0" err="1"/>
+              <a:t>Vaadin</a:t>
+            </a:r>
+            <a:endParaRPr lang="es-ES" dirty="0"/>
+          </a:p>
+        </p:txBody>
+      </p:sp>
+      <p:sp>
+        <p:nvSpPr>
+          <p:cNvPr id="3" name="Marcador de contenido 2">
+            <a:extLst>
+              <a:ext uri="{FF2B5EF4-FFF2-40B4-BE49-F238E27FC236}">
+                <a16:creationId xmlns:a16="http://schemas.microsoft.com/office/drawing/2014/main" id="{8F04E864-F0F7-4078-B170-CED53D5F910D}"/>
+              </a:ext>
+            </a:extLst>
+          </p:cNvPr>
+          <p:cNvSpPr>
+            <a:spLocks noGrp="1"/>
+          </p:cNvSpPr>
+          <p:nvPr>
+            <p:ph idx="1"/>
+          </p:nvPr>
+        </p:nvSpPr>
+        <p:spPr/>
+        <p:txBody>
+          <a:bodyPr/>
+          <a:lstStyle/>
+          <a:p>
+            <a:r>
+              <a:rPr lang="es-ES" dirty="0"/>
+              <a:t>Proyecto genérico con un modelo de datos independiente.</a:t>
+            </a:r>
+          </a:p>
+          <a:p>
+            <a:r>
+              <a:rPr lang="es-ES" dirty="0"/>
+              <a:t>Realiza las funciones de un </a:t>
+            </a:r>
+            <a:r>
+              <a:rPr lang="es-ES" i="1" dirty="0"/>
+              <a:t>Componente</a:t>
+            </a:r>
+            <a:r>
+              <a:rPr lang="es-ES" dirty="0"/>
+              <a:t> de </a:t>
+            </a:r>
+            <a:r>
+              <a:rPr lang="es-ES" dirty="0" err="1"/>
+              <a:t>Vaadin</a:t>
+            </a:r>
+            <a:r>
+              <a:rPr lang="es-ES" dirty="0"/>
+              <a:t>.</a:t>
+            </a:r>
+          </a:p>
+          <a:p>
+            <a:pPr lvl="1"/>
+            <a:r>
+              <a:rPr lang="es-ES" dirty="0"/>
+              <a:t>Componente</a:t>
+            </a:r>
+          </a:p>
+          <a:p>
+            <a:pPr lvl="1"/>
+            <a:r>
+              <a:rPr lang="es-ES" dirty="0"/>
+              <a:t>Estado del componente</a:t>
+            </a:r>
+          </a:p>
+        </p:txBody>
+      </p:sp>
+    </p:spTree>
+    <p:extLst>
+      <p:ext uri="{BB962C8B-B14F-4D97-AF65-F5344CB8AC3E}">
+        <p14:creationId xmlns:p14="http://schemas.microsoft.com/office/powerpoint/2010/main" val="722953705"/>
+      </p:ext>
+    </p:extLst>
+  </p:cSld>
+  <p:clrMapOvr>
+    <a:masterClrMapping/>
+  </p:clrMapOvr>
+</p:sld>
+</file>
+
+<file path=ppt/slides/slide14.xml><?xml version="1.0" encoding="utf-8"?>
+<p:sld xmlns:a="http://schemas.openxmlformats.org/drawingml/2006/main" xmlns:r="http://schemas.openxmlformats.org/officeDocument/2006/relationships" xmlns:p="http://schemas.openxmlformats.org/presentationml/2006/main">
+  <p:cSld>
+    <p:bg>
+      <p:bgPr>
+        <a:solidFill>
+          <a:schemeClr val="bg1"/>
+        </a:solidFill>
+        <a:effectLst/>
+      </p:bgPr>
+    </p:bg>
+    <p:spTree>
+      <p:nvGrpSpPr>
+        <p:cNvPr id="1" name=""/>
+        <p:cNvGrpSpPr/>
+        <p:nvPr/>
+      </p:nvGrpSpPr>
+      <p:grpSpPr>
+        <a:xfrm>
+          <a:off x="0" y="0"/>
+          <a:ext cx="0" cy="0"/>
+          <a:chOff x="0" y="0"/>
+          <a:chExt cx="0" cy="0"/>
+        </a:xfrm>
+      </p:grpSpPr>
+      <p:pic>
+        <p:nvPicPr>
+          <p:cNvPr id="1026" name="Picture 2" descr="Imagen que contiene texto, mapa&#10;&#10;Descripción generada con confianza muy alta">
+            <a:extLst>
+              <a:ext uri="{FF2B5EF4-FFF2-40B4-BE49-F238E27FC236}">
+                <a16:creationId xmlns:a16="http://schemas.microsoft.com/office/drawing/2014/main" id="{6C74C914-AA6B-4FBA-911C-FF4743708AF9}"/>
+              </a:ext>
+            </a:extLst>
+          </p:cNvPr>
+          <p:cNvPicPr>
+            <a:picLocks noChangeAspect="1" noChangeArrowheads="1"/>
+          </p:cNvPicPr>
+          <p:nvPr/>
+        </p:nvPicPr>
+        <p:blipFill>
+          <a:blip r:embed="rId2">
+            <a:extLst>
+              <a:ext uri="{28A0092B-C50C-407E-A947-70E740481C1C}">
+                <a14:useLocalDpi xmlns:a14="http://schemas.microsoft.com/office/drawing/2010/main" val="0"/>
+              </a:ext>
+            </a:extLst>
+          </a:blip>
+          <a:srcRect/>
+          <a:stretch>
+            <a:fillRect/>
+          </a:stretch>
+        </p:blipFill>
+        <p:spPr bwMode="auto">
+          <a:xfrm>
+            <a:off x="660813" y="643466"/>
+            <a:ext cx="10870374" cy="5571067"/>
+          </a:xfrm>
+          <a:prstGeom prst="rect">
+            <a:avLst/>
+          </a:prstGeom>
+          <a:solidFill>
+            <a:srgbClr val="FFFFFF"/>
+          </a:solidFill>
+          <a:extLst>
+            <a:ext uri="{91240B29-F687-4F45-9708-019B960494DF}">
+              <a14:hiddenLine xmlns:a14="http://schemas.microsoft.com/office/drawing/2010/main" w="9525">
+                <a:solidFill>
+                  <a:srgbClr val="000000"/>
+                </a:solidFill>
+                <a:miter lim="800000"/>
+                <a:headEnd/>
+                <a:tailEnd/>
+              </a14:hiddenLine>
+            </a:ext>
+          </a:extLst>
+        </p:spPr>
+      </p:pic>
+    </p:spTree>
+    <p:extLst>
+      <p:ext uri="{BB962C8B-B14F-4D97-AF65-F5344CB8AC3E}">
+        <p14:creationId xmlns:p14="http://schemas.microsoft.com/office/powerpoint/2010/main" val="1541072637"/>
+      </p:ext>
+    </p:extLst>
+  </p:cSld>
+  <p:clrMapOvr>
+    <a:masterClrMapping/>
+  </p:clrMapOvr>
+</p:sld>
+</file>
+
+<file path=ppt/slides/slide15.xml><?xml version="1.0" encoding="utf-8"?>
+<p:sld xmlns:a="http://schemas.openxmlformats.org/drawingml/2006/main" xmlns:r="http://schemas.openxmlformats.org/officeDocument/2006/relationships" xmlns:p="http://schemas.openxmlformats.org/presentationml/2006/main">
+  <p:cSld>
+    <p:spTree>
+      <p:nvGrpSpPr>
+        <p:cNvPr id="1" name=""/>
+        <p:cNvGrpSpPr/>
+        <p:nvPr/>
+      </p:nvGrpSpPr>
+      <p:grpSpPr>
+        <a:xfrm>
+          <a:off x="0" y="0"/>
+          <a:ext cx="0" cy="0"/>
+          <a:chOff x="0" y="0"/>
+          <a:chExt cx="0" cy="0"/>
+        </a:xfrm>
+      </p:grpSpPr>
+      <p:sp>
+        <p:nvSpPr>
+          <p:cNvPr id="2" name="Título 1">
+            <a:extLst>
+              <a:ext uri="{FF2B5EF4-FFF2-40B4-BE49-F238E27FC236}">
+                <a16:creationId xmlns:a16="http://schemas.microsoft.com/office/drawing/2014/main" id="{79F096A9-EDF3-4BB1-8B92-30998B1EE30E}"/>
+              </a:ext>
+            </a:extLst>
+          </p:cNvPr>
+          <p:cNvSpPr>
+            <a:spLocks noGrp="1"/>
+          </p:cNvSpPr>
+          <p:nvPr>
+            <p:ph type="title"/>
+          </p:nvPr>
+        </p:nvSpPr>
+        <p:spPr/>
+        <p:txBody>
+          <a:bodyPr/>
+          <a:lstStyle/>
+          <a:p>
+            <a:r>
+              <a:rPr lang="es-ES" dirty="0"/>
+              <a:t>Integración LUCA</a:t>
+            </a:r>
+          </a:p>
+        </p:txBody>
+      </p:sp>
+      <p:sp>
+        <p:nvSpPr>
+          <p:cNvPr id="3" name="Marcador de contenido 2">
+            <a:extLst>
+              <a:ext uri="{FF2B5EF4-FFF2-40B4-BE49-F238E27FC236}">
+                <a16:creationId xmlns:a16="http://schemas.microsoft.com/office/drawing/2014/main" id="{E210E3E5-9472-4D89-945C-B9A68EF1D313}"/>
+              </a:ext>
+            </a:extLst>
+          </p:cNvPr>
+          <p:cNvSpPr>
+            <a:spLocks noGrp="1"/>
+          </p:cNvSpPr>
+          <p:nvPr>
+            <p:ph idx="1"/>
+          </p:nvPr>
+        </p:nvSpPr>
+        <p:spPr/>
+        <p:txBody>
+          <a:bodyPr/>
+          <a:lstStyle/>
+          <a:p>
+            <a:r>
+              <a:rPr lang="es-ES" dirty="0"/>
+              <a:t>Operaciones de gestión(</a:t>
+            </a:r>
+            <a:r>
+              <a:rPr lang="es-ES" i="1" dirty="0"/>
+              <a:t>CRUD) </a:t>
+            </a:r>
+            <a:r>
+              <a:rPr lang="es-ES" dirty="0"/>
+              <a:t>sobre los procesos.</a:t>
+            </a:r>
+          </a:p>
+          <a:p>
+            <a:r>
+              <a:rPr lang="es-ES" dirty="0"/>
+              <a:t>Ejecución de procesos.</a:t>
+            </a:r>
+          </a:p>
+          <a:p>
+            <a:r>
+              <a:rPr lang="es-ES" dirty="0"/>
+              <a:t>Alteración del flujo de ejecución.</a:t>
+            </a:r>
+          </a:p>
+          <a:p>
+            <a:r>
+              <a:rPr lang="es-ES" dirty="0"/>
+              <a:t>Comprobación de restricciones.</a:t>
+            </a:r>
+          </a:p>
+          <a:p>
+            <a:r>
+              <a:rPr lang="es-ES" dirty="0"/>
+              <a:t>Visualización del flujo de ejecución.</a:t>
+            </a:r>
+          </a:p>
+          <a:p>
+            <a:r>
+              <a:rPr lang="es-ES" dirty="0"/>
+              <a:t>Exportación de los resultados.</a:t>
+            </a:r>
+          </a:p>
+          <a:p>
+            <a:endParaRPr lang="es-ES" dirty="0"/>
+          </a:p>
+        </p:txBody>
+      </p:sp>
+    </p:spTree>
+    <p:extLst>
+      <p:ext uri="{BB962C8B-B14F-4D97-AF65-F5344CB8AC3E}">
+        <p14:creationId xmlns:p14="http://schemas.microsoft.com/office/powerpoint/2010/main" val="1029946581"/>
+      </p:ext>
+    </p:extLst>
+  </p:cSld>
+  <p:clrMapOvr>
+    <a:masterClrMapping/>
+  </p:clrMapOvr>
+</p:sld>
+</file>
+
+<file path=ppt/slides/slide16.xml><?xml version="1.0" encoding="utf-8"?>
+<p:sld xmlns:a="http://schemas.openxmlformats.org/drawingml/2006/main" xmlns:r="http://schemas.openxmlformats.org/officeDocument/2006/relationships" xmlns:p="http://schemas.openxmlformats.org/presentationml/2006/main">
+  <p:cSld>
+    <p:bg>
+      <p:bgPr>
+        <a:solidFill>
+          <a:schemeClr val="bg1"/>
+        </a:solidFill>
+        <a:effectLst/>
+      </p:bgPr>
+    </p:bg>
+    <p:spTree>
+      <p:nvGrpSpPr>
+        <p:cNvPr id="1" name=""/>
+        <p:cNvGrpSpPr/>
+        <p:nvPr/>
+      </p:nvGrpSpPr>
+      <p:grpSpPr>
+        <a:xfrm>
+          <a:off x="0" y="0"/>
+          <a:ext cx="0" cy="0"/>
+          <a:chOff x="0" y="0"/>
+          <a:chExt cx="0" cy="0"/>
+        </a:xfrm>
+      </p:grpSpPr>
+      <p:pic>
+        <p:nvPicPr>
+          <p:cNvPr id="5" name="Marcador de contenido 4" descr="Imagen que contiene captura de pantalla&#10;&#10;Descripción generada con confianza muy alta">
+            <a:extLst>
+              <a:ext uri="{FF2B5EF4-FFF2-40B4-BE49-F238E27FC236}">
+                <a16:creationId xmlns:a16="http://schemas.microsoft.com/office/drawing/2014/main" id="{B3FB6D7F-1642-4D93-AD7F-E10F53155D22}"/>
+              </a:ext>
+            </a:extLst>
+          </p:cNvPr>
+          <p:cNvPicPr>
+            <a:picLocks noGrp="1" noChangeAspect="1"/>
+          </p:cNvPicPr>
+          <p:nvPr>
+            <p:ph idx="1"/>
+          </p:nvPr>
+        </p:nvPicPr>
+        <p:blipFill rotWithShape="1">
+          <a:blip r:embed="rId2">
+            <a:extLst>
+              <a:ext uri="{28A0092B-C50C-407E-A947-70E740481C1C}">
+                <a14:useLocalDpi xmlns:a14="http://schemas.microsoft.com/office/drawing/2010/main" val="0"/>
+              </a:ext>
+            </a:extLst>
+          </a:blip>
+          <a:srcRect r="888" b="-1"/>
+          <a:stretch/>
+        </p:blipFill>
+        <p:spPr>
+          <a:xfrm>
+            <a:off x="20" y="10"/>
+            <a:ext cx="12191980" cy="6857990"/>
+          </a:xfrm>
+          <a:prstGeom prst="rect">
+            <a:avLst/>
+          </a:prstGeom>
+        </p:spPr>
+      </p:pic>
+    </p:spTree>
+    <p:extLst>
+      <p:ext uri="{BB962C8B-B14F-4D97-AF65-F5344CB8AC3E}">
+        <p14:creationId xmlns:p14="http://schemas.microsoft.com/office/powerpoint/2010/main" val="4159925077"/>
+      </p:ext>
+    </p:extLst>
+  </p:cSld>
+  <p:clrMapOvr>
+    <a:masterClrMapping/>
+  </p:clrMapOvr>
+</p:sld>
+</file>
+
+<file path=ppt/slides/slide17.xml><?xml version="1.0" encoding="utf-8"?>
+<p:sld xmlns:a="http://schemas.openxmlformats.org/drawingml/2006/main" xmlns:r="http://schemas.openxmlformats.org/officeDocument/2006/relationships" xmlns:p="http://schemas.openxmlformats.org/presentationml/2006/main">
+  <p:cSld>
+    <p:spTree>
+      <p:nvGrpSpPr>
+        <p:cNvPr id="1" name=""/>
+        <p:cNvGrpSpPr/>
+        <p:nvPr/>
+      </p:nvGrpSpPr>
+      <p:grpSpPr>
+        <a:xfrm>
+          <a:off x="0" y="0"/>
+          <a:ext cx="0" cy="0"/>
+          <a:chOff x="0" y="0"/>
+          <a:chExt cx="0" cy="0"/>
+        </a:xfrm>
+      </p:grpSpPr>
+      <p:sp>
+        <p:nvSpPr>
+          <p:cNvPr id="2" name="Título 1">
+            <a:extLst>
+              <a:ext uri="{FF2B5EF4-FFF2-40B4-BE49-F238E27FC236}">
+                <a16:creationId xmlns:a16="http://schemas.microsoft.com/office/drawing/2014/main" id="{E4734409-F975-47F4-B4A5-DC8ED1A4E7BA}"/>
+              </a:ext>
+            </a:extLst>
+          </p:cNvPr>
+          <p:cNvSpPr>
+            <a:spLocks noGrp="1"/>
+          </p:cNvSpPr>
+          <p:nvPr>
+            <p:ph type="title"/>
+          </p:nvPr>
+        </p:nvSpPr>
+        <p:spPr/>
+        <p:txBody>
+          <a:bodyPr/>
+          <a:lstStyle/>
+          <a:p>
+            <a:r>
+              <a:rPr lang="es-ES" dirty="0"/>
+              <a:t>Negocio y Persistencia: JPA</a:t>
+            </a:r>
+          </a:p>
+        </p:txBody>
+      </p:sp>
+      <p:sp>
+        <p:nvSpPr>
+          <p:cNvPr id="3" name="Marcador de contenido 2">
+            <a:extLst>
+              <a:ext uri="{FF2B5EF4-FFF2-40B4-BE49-F238E27FC236}">
+                <a16:creationId xmlns:a16="http://schemas.microsoft.com/office/drawing/2014/main" id="{4523B2AC-0BC9-4C72-819A-1342F12BF34A}"/>
+              </a:ext>
+            </a:extLst>
+          </p:cNvPr>
+          <p:cNvSpPr>
+            <a:spLocks noGrp="1"/>
+          </p:cNvSpPr>
+          <p:nvPr>
+            <p:ph idx="1"/>
+          </p:nvPr>
+        </p:nvSpPr>
+        <p:spPr/>
+        <p:txBody>
+          <a:bodyPr/>
+          <a:lstStyle/>
+          <a:p>
+            <a:r>
+              <a:rPr lang="es-ES" dirty="0"/>
+              <a:t>Código de como se comunica la app con </a:t>
+            </a:r>
+            <a:r>
+              <a:rPr lang="es-ES" dirty="0" err="1"/>
+              <a:t>jpa</a:t>
+            </a:r>
+            <a:endParaRPr lang="es-ES" dirty="0"/>
+          </a:p>
+          <a:p>
+            <a:endParaRPr lang="es-ES" dirty="0"/>
+          </a:p>
+        </p:txBody>
+      </p:sp>
+    </p:spTree>
+    <p:extLst>
+      <p:ext uri="{BB962C8B-B14F-4D97-AF65-F5344CB8AC3E}">
+        <p14:creationId xmlns:p14="http://schemas.microsoft.com/office/powerpoint/2010/main" val="2464011412"/>
+      </p:ext>
+    </p:extLst>
+  </p:cSld>
+  <p:clrMapOvr>
+    <a:masterClrMapping/>
+  </p:clrMapOvr>
+</p:sld>
+</file>
+
+<file path=ppt/slides/slide18.xml><?xml version="1.0" encoding="utf-8"?>
+<p:sld xmlns:a="http://schemas.openxmlformats.org/drawingml/2006/main" xmlns:r="http://schemas.openxmlformats.org/officeDocument/2006/relationships" xmlns:p="http://schemas.openxmlformats.org/presentationml/2006/main">
+  <p:cSld>
+    <p:bg>
+      <p:bgPr>
+        <a:solidFill>
+          <a:schemeClr val="bg1"/>
+        </a:solidFill>
+        <a:effectLst/>
+      </p:bgPr>
+    </p:bg>
+    <p:spTree>
+      <p:nvGrpSpPr>
+        <p:cNvPr id="1" name=""/>
+        <p:cNvGrpSpPr/>
+        <p:nvPr/>
+      </p:nvGrpSpPr>
+      <p:grpSpPr>
+        <a:xfrm>
+          <a:off x="0" y="0"/>
+          <a:ext cx="0" cy="0"/>
+          <a:chOff x="0" y="0"/>
+          <a:chExt cx="0" cy="0"/>
+        </a:xfrm>
+      </p:grpSpPr>
+      <p:pic>
+        <p:nvPicPr>
+          <p:cNvPr id="7" name="Marcador de contenido 4" descr="Imagen que contiene mapa, texto&#10;&#10;Descripción generada con confianza muy alta">
+            <a:extLst>
+              <a:ext uri="{FF2B5EF4-FFF2-40B4-BE49-F238E27FC236}">
+                <a16:creationId xmlns:a16="http://schemas.microsoft.com/office/drawing/2014/main" id="{966C0D44-B068-48ED-B81C-4F2A337B0518}"/>
+              </a:ext>
+            </a:extLst>
+          </p:cNvPr>
+          <p:cNvPicPr>
+            <a:picLocks noChangeAspect="1"/>
+          </p:cNvPicPr>
+          <p:nvPr/>
+        </p:nvPicPr>
+        <p:blipFill>
+          <a:blip r:embed="rId2">
+            <a:extLst>
+              <a:ext uri="{28A0092B-C50C-407E-A947-70E740481C1C}">
+                <a14:useLocalDpi xmlns:a14="http://schemas.microsoft.com/office/drawing/2010/main" val="0"/>
+              </a:ext>
+            </a:extLst>
+          </a:blip>
+          <a:stretch>
+            <a:fillRect/>
+          </a:stretch>
+        </p:blipFill>
+        <p:spPr>
+          <a:xfrm>
+            <a:off x="890954" y="0"/>
+            <a:ext cx="10456984" cy="6806184"/>
+          </a:xfrm>
+          <a:prstGeom prst="rect">
+            <a:avLst/>
+          </a:prstGeom>
+        </p:spPr>
+      </p:pic>
+    </p:spTree>
+    <p:extLst>
+      <p:ext uri="{BB962C8B-B14F-4D97-AF65-F5344CB8AC3E}">
+        <p14:creationId xmlns:p14="http://schemas.microsoft.com/office/powerpoint/2010/main" val="1610976999"/>
+      </p:ext>
+    </p:extLst>
+  </p:cSld>
+  <p:clrMapOvr>
+    <a:masterClrMapping/>
+  </p:clrMapOvr>
+</p:sld>
+</file>
+
+<file path=ppt/slides/slide19.xml><?xml version="1.0" encoding="utf-8"?>
+<p:sld xmlns:a="http://schemas.openxmlformats.org/drawingml/2006/main" xmlns:r="http://schemas.openxmlformats.org/officeDocument/2006/relationships" xmlns:p="http://schemas.openxmlformats.org/presentationml/2006/main">
+  <p:cSld>
+    <p:spTree>
+      <p:nvGrpSpPr>
+        <p:cNvPr id="1" name=""/>
+        <p:cNvGrpSpPr/>
+        <p:nvPr/>
+      </p:nvGrpSpPr>
+      <p:grpSpPr>
+        <a:xfrm>
+          <a:off x="0" y="0"/>
+          <a:ext cx="0" cy="0"/>
+          <a:chOff x="0" y="0"/>
+          <a:chExt cx="0" cy="0"/>
+        </a:xfrm>
+      </p:grpSpPr>
+      <p:sp>
+        <p:nvSpPr>
+          <p:cNvPr id="2" name="Título 1">
+            <a:extLst>
+              <a:ext uri="{FF2B5EF4-FFF2-40B4-BE49-F238E27FC236}">
+                <a16:creationId xmlns:a16="http://schemas.microsoft.com/office/drawing/2014/main" id="{6F38F9B1-D69F-46D5-98D7-0BCDEDDD829A}"/>
+              </a:ext>
+            </a:extLst>
+          </p:cNvPr>
+          <p:cNvSpPr>
+            <a:spLocks noGrp="1"/>
+          </p:cNvSpPr>
+          <p:nvPr>
+            <p:ph type="title"/>
+          </p:nvPr>
+        </p:nvSpPr>
+        <p:spPr/>
+        <p:txBody>
+          <a:bodyPr/>
+          <a:lstStyle/>
+          <a:p>
+            <a:r>
+              <a:rPr lang="es-ES" dirty="0"/>
+              <a:t>Ejecución de Procesos</a:t>
+            </a:r>
+          </a:p>
+        </p:txBody>
+      </p:sp>
+      <p:sp>
+        <p:nvSpPr>
+          <p:cNvPr id="3" name="Marcador de contenido 2">
+            <a:extLst>
+              <a:ext uri="{FF2B5EF4-FFF2-40B4-BE49-F238E27FC236}">
+                <a16:creationId xmlns:a16="http://schemas.microsoft.com/office/drawing/2014/main" id="{60C3494A-DDDA-4312-8CFD-2924FB1E1338}"/>
+              </a:ext>
+            </a:extLst>
+          </p:cNvPr>
+          <p:cNvSpPr>
+            <a:spLocks noGrp="1"/>
+          </p:cNvSpPr>
+          <p:nvPr>
+            <p:ph idx="1"/>
+          </p:nvPr>
+        </p:nvSpPr>
+        <p:spPr/>
+        <p:txBody>
+          <a:bodyPr/>
+          <a:lstStyle/>
+          <a:p>
+            <a:r>
+              <a:rPr lang="es-ES" dirty="0"/>
+              <a:t>Ejecución encadenada de las consultas.</a:t>
+            </a:r>
+          </a:p>
+          <a:p>
+            <a:r>
+              <a:rPr lang="es-ES" dirty="0"/>
+              <a:t>Comunicación progresiva del estado de la ejecución.</a:t>
+            </a:r>
+          </a:p>
+          <a:p>
+            <a:r>
+              <a:rPr lang="es-ES" dirty="0"/>
+              <a:t>Visualización gráfica del flujo. </a:t>
+            </a:r>
+          </a:p>
+        </p:txBody>
+      </p:sp>
+    </p:spTree>
+    <p:extLst>
+      <p:ext uri="{BB962C8B-B14F-4D97-AF65-F5344CB8AC3E}">
+        <p14:creationId xmlns:p14="http://schemas.microsoft.com/office/powerpoint/2010/main" val="612326867"/>
       </p:ext>
     </p:extLst>
   </p:cSld>
@@ -3538,7 +4702,7 @@
           <a:lstStyle/>
           <a:p>
             <a:r>
-              <a:rPr lang="es-ES" dirty="0" err="1" smtClean="0"/>
+              <a:rPr lang="es-ES" dirty="0" err="1"/>
               <a:t>Indice</a:t>
             </a:r>
             <a:endParaRPr lang="es-ES" dirty="0"/>
@@ -3568,6 +4732,910 @@
     <p:extLst>
       <p:ext uri="{BB962C8B-B14F-4D97-AF65-F5344CB8AC3E}">
         <p14:creationId xmlns:p14="http://schemas.microsoft.com/office/powerpoint/2010/main" val="3066541909"/>
+      </p:ext>
+    </p:extLst>
+  </p:cSld>
+  <p:clrMapOvr>
+    <a:masterClrMapping/>
+  </p:clrMapOvr>
+</p:sld>
+</file>
+
+<file path=ppt/slides/slide20.xml><?xml version="1.0" encoding="utf-8"?>
+<p:sld xmlns:a="http://schemas.openxmlformats.org/drawingml/2006/main" xmlns:r="http://schemas.openxmlformats.org/officeDocument/2006/relationships" xmlns:p="http://schemas.openxmlformats.org/presentationml/2006/main">
+  <p:cSld>
+    <p:spTree>
+      <p:nvGrpSpPr>
+        <p:cNvPr id="1" name=""/>
+        <p:cNvGrpSpPr/>
+        <p:nvPr/>
+      </p:nvGrpSpPr>
+      <p:grpSpPr>
+        <a:xfrm>
+          <a:off x="0" y="0"/>
+          <a:ext cx="0" cy="0"/>
+          <a:chOff x="0" y="0"/>
+          <a:chExt cx="0" cy="0"/>
+        </a:xfrm>
+      </p:grpSpPr>
+      <p:sp>
+        <p:nvSpPr>
+          <p:cNvPr id="2" name="Título 1">
+            <a:extLst>
+              <a:ext uri="{FF2B5EF4-FFF2-40B4-BE49-F238E27FC236}">
+                <a16:creationId xmlns:a16="http://schemas.microsoft.com/office/drawing/2014/main" id="{22C89AF3-54CA-433F-9A06-C2FBC298FFA1}"/>
+              </a:ext>
+            </a:extLst>
+          </p:cNvPr>
+          <p:cNvSpPr>
+            <a:spLocks noGrp="1"/>
+          </p:cNvSpPr>
+          <p:nvPr>
+            <p:ph type="title"/>
+          </p:nvPr>
+        </p:nvSpPr>
+        <p:spPr/>
+        <p:txBody>
+          <a:bodyPr/>
+          <a:lstStyle/>
+          <a:p>
+            <a:endParaRPr lang="es-ES"/>
+          </a:p>
+        </p:txBody>
+      </p:sp>
+      <p:sp>
+        <p:nvSpPr>
+          <p:cNvPr id="3" name="Marcador de contenido 2">
+            <a:extLst>
+              <a:ext uri="{FF2B5EF4-FFF2-40B4-BE49-F238E27FC236}">
+                <a16:creationId xmlns:a16="http://schemas.microsoft.com/office/drawing/2014/main" id="{50F99617-E0DE-4E79-9230-AA204649BB56}"/>
+              </a:ext>
+            </a:extLst>
+          </p:cNvPr>
+          <p:cNvSpPr>
+            <a:spLocks noGrp="1"/>
+          </p:cNvSpPr>
+          <p:nvPr>
+            <p:ph idx="1"/>
+          </p:nvPr>
+        </p:nvSpPr>
+        <p:spPr/>
+        <p:txBody>
+          <a:bodyPr/>
+          <a:lstStyle/>
+          <a:p>
+            <a:r>
+              <a:rPr lang="es-ES" dirty="0"/>
+              <a:t>Video de ejecución y especificación de una consulta</a:t>
+            </a:r>
+          </a:p>
+        </p:txBody>
+      </p:sp>
+    </p:spTree>
+    <p:extLst>
+      <p:ext uri="{BB962C8B-B14F-4D97-AF65-F5344CB8AC3E}">
+        <p14:creationId xmlns:p14="http://schemas.microsoft.com/office/powerpoint/2010/main" val="813389958"/>
+      </p:ext>
+    </p:extLst>
+  </p:cSld>
+  <p:clrMapOvr>
+    <a:masterClrMapping/>
+  </p:clrMapOvr>
+</p:sld>
+</file>
+
+<file path=ppt/slides/slide21.xml><?xml version="1.0" encoding="utf-8"?>
+<p:sld xmlns:a="http://schemas.openxmlformats.org/drawingml/2006/main" xmlns:r="http://schemas.openxmlformats.org/officeDocument/2006/relationships" xmlns:p="http://schemas.openxmlformats.org/presentationml/2006/main">
+  <p:cSld>
+    <p:spTree>
+      <p:nvGrpSpPr>
+        <p:cNvPr id="1" name=""/>
+        <p:cNvGrpSpPr/>
+        <p:nvPr/>
+      </p:nvGrpSpPr>
+      <p:grpSpPr>
+        <a:xfrm>
+          <a:off x="0" y="0"/>
+          <a:ext cx="0" cy="0"/>
+          <a:chOff x="0" y="0"/>
+          <a:chExt cx="0" cy="0"/>
+        </a:xfrm>
+      </p:grpSpPr>
+      <p:sp>
+        <p:nvSpPr>
+          <p:cNvPr id="2" name="Título 1">
+            <a:extLst>
+              <a:ext uri="{FF2B5EF4-FFF2-40B4-BE49-F238E27FC236}">
+                <a16:creationId xmlns:a16="http://schemas.microsoft.com/office/drawing/2014/main" id="{C9287869-97B2-4EFC-B85D-0CB43C8B04A3}"/>
+              </a:ext>
+            </a:extLst>
+          </p:cNvPr>
+          <p:cNvSpPr>
+            <a:spLocks noGrp="1"/>
+          </p:cNvSpPr>
+          <p:nvPr>
+            <p:ph type="title"/>
+          </p:nvPr>
+        </p:nvSpPr>
+        <p:spPr/>
+        <p:txBody>
+          <a:bodyPr/>
+          <a:lstStyle/>
+          <a:p>
+            <a:r>
+              <a:rPr lang="es-ES" dirty="0"/>
+              <a:t>Pruebas</a:t>
+            </a:r>
+          </a:p>
+        </p:txBody>
+      </p:sp>
+      <p:sp>
+        <p:nvSpPr>
+          <p:cNvPr id="3" name="Marcador de contenido 2">
+            <a:extLst>
+              <a:ext uri="{FF2B5EF4-FFF2-40B4-BE49-F238E27FC236}">
+                <a16:creationId xmlns:a16="http://schemas.microsoft.com/office/drawing/2014/main" id="{7AF0E4CE-2A2B-4DAC-AC09-32FE0C4C3D09}"/>
+              </a:ext>
+            </a:extLst>
+          </p:cNvPr>
+          <p:cNvSpPr>
+            <a:spLocks noGrp="1"/>
+          </p:cNvSpPr>
+          <p:nvPr>
+            <p:ph idx="1"/>
+          </p:nvPr>
+        </p:nvSpPr>
+        <p:spPr/>
+        <p:txBody>
+          <a:bodyPr/>
+          <a:lstStyle/>
+          <a:p>
+            <a:r>
+              <a:rPr lang="es-ES" dirty="0"/>
+              <a:t>Unitarias: JPA</a:t>
+            </a:r>
+          </a:p>
+          <a:p>
+            <a:r>
+              <a:rPr lang="es-ES" dirty="0"/>
+              <a:t>Editor gráfico.</a:t>
+            </a:r>
+          </a:p>
+          <a:p>
+            <a:r>
+              <a:rPr lang="es-ES" dirty="0"/>
+              <a:t>Componente genérico.</a:t>
+            </a:r>
+          </a:p>
+          <a:p>
+            <a:r>
+              <a:rPr lang="es-ES" dirty="0"/>
+              <a:t>Capa de Servicios de los Procesos: Automatizadas</a:t>
+            </a:r>
+          </a:p>
+        </p:txBody>
+      </p:sp>
+    </p:spTree>
+    <p:extLst>
+      <p:ext uri="{BB962C8B-B14F-4D97-AF65-F5344CB8AC3E}">
+        <p14:creationId xmlns:p14="http://schemas.microsoft.com/office/powerpoint/2010/main" val="3136312610"/>
+      </p:ext>
+    </p:extLst>
+  </p:cSld>
+  <p:clrMapOvr>
+    <a:masterClrMapping/>
+  </p:clrMapOvr>
+</p:sld>
+</file>
+
+<file path=ppt/slides/slide22.xml><?xml version="1.0" encoding="utf-8"?>
+<p:sld xmlns:a="http://schemas.openxmlformats.org/drawingml/2006/main" xmlns:r="http://schemas.openxmlformats.org/officeDocument/2006/relationships" xmlns:p="http://schemas.openxmlformats.org/presentationml/2006/main">
+  <p:cSld>
+    <p:spTree>
+      <p:nvGrpSpPr>
+        <p:cNvPr id="1" name=""/>
+        <p:cNvGrpSpPr/>
+        <p:nvPr/>
+      </p:nvGrpSpPr>
+      <p:grpSpPr>
+        <a:xfrm>
+          <a:off x="0" y="0"/>
+          <a:ext cx="0" cy="0"/>
+          <a:chOff x="0" y="0"/>
+          <a:chExt cx="0" cy="0"/>
+        </a:xfrm>
+      </p:grpSpPr>
+      <p:sp>
+        <p:nvSpPr>
+          <p:cNvPr id="2" name="Título 1">
+            <a:extLst>
+              <a:ext uri="{FF2B5EF4-FFF2-40B4-BE49-F238E27FC236}">
+                <a16:creationId xmlns:a16="http://schemas.microsoft.com/office/drawing/2014/main" id="{AA4107EC-86B4-40CF-9A8E-A557F92F8A7B}"/>
+              </a:ext>
+            </a:extLst>
+          </p:cNvPr>
+          <p:cNvSpPr>
+            <a:spLocks noGrp="1"/>
+          </p:cNvSpPr>
+          <p:nvPr>
+            <p:ph type="title"/>
+          </p:nvPr>
+        </p:nvSpPr>
+        <p:spPr/>
+        <p:txBody>
+          <a:bodyPr/>
+          <a:lstStyle/>
+          <a:p>
+            <a:r>
+              <a:rPr lang="es-ES" dirty="0"/>
+              <a:t>Sumario</a:t>
+            </a:r>
+          </a:p>
+        </p:txBody>
+      </p:sp>
+      <p:sp>
+        <p:nvSpPr>
+          <p:cNvPr id="3" name="Marcador de contenido 2">
+            <a:extLst>
+              <a:ext uri="{FF2B5EF4-FFF2-40B4-BE49-F238E27FC236}">
+                <a16:creationId xmlns:a16="http://schemas.microsoft.com/office/drawing/2014/main" id="{BEBE750A-B8B7-48D8-9D83-3BD60F837129}"/>
+              </a:ext>
+            </a:extLst>
+          </p:cNvPr>
+          <p:cNvSpPr>
+            <a:spLocks noGrp="1"/>
+          </p:cNvSpPr>
+          <p:nvPr>
+            <p:ph idx="1"/>
+          </p:nvPr>
+        </p:nvSpPr>
+        <p:spPr/>
+        <p:txBody>
+          <a:bodyPr/>
+          <a:lstStyle/>
+          <a:p>
+            <a:r>
+              <a:rPr lang="es-ES" dirty="0"/>
+              <a:t>Especificación gráfica de procesos</a:t>
+            </a:r>
+          </a:p>
+          <a:p>
+            <a:r>
+              <a:rPr lang="es-ES" dirty="0"/>
+              <a:t>Alteración de la ejecución del flujo de ejecución de un proceso en función de los valores de las salidas. </a:t>
+            </a:r>
+          </a:p>
+          <a:p>
+            <a:r>
+              <a:rPr lang="es-ES" dirty="0"/>
+              <a:t>Comprobación de la corrección de la conexión entre salidas y entradas de las consultas que componen un proceso.</a:t>
+            </a:r>
+          </a:p>
+          <a:p>
+            <a:r>
+              <a:rPr lang="es-ES" dirty="0"/>
+              <a:t>Ejecución de procesos.</a:t>
+            </a:r>
+          </a:p>
+          <a:p>
+            <a:r>
+              <a:rPr lang="es-ES" dirty="0"/>
+              <a:t>Ejecución paso a paso de los procesos.</a:t>
+            </a:r>
+          </a:p>
+          <a:p>
+            <a:r>
+              <a:rPr lang="es-ES" dirty="0"/>
+              <a:t>Exportar los resultados de los procesos.</a:t>
+            </a:r>
+          </a:p>
+        </p:txBody>
+      </p:sp>
+    </p:spTree>
+    <p:extLst>
+      <p:ext uri="{BB962C8B-B14F-4D97-AF65-F5344CB8AC3E}">
+        <p14:creationId xmlns:p14="http://schemas.microsoft.com/office/powerpoint/2010/main" val="118922523"/>
+      </p:ext>
+    </p:extLst>
+  </p:cSld>
+  <p:clrMapOvr>
+    <a:masterClrMapping/>
+  </p:clrMapOvr>
+</p:sld>
+</file>
+
+<file path=ppt/slides/slide23.xml><?xml version="1.0" encoding="utf-8"?>
+<p:sld xmlns:a="http://schemas.openxmlformats.org/drawingml/2006/main" xmlns:r="http://schemas.openxmlformats.org/officeDocument/2006/relationships" xmlns:p="http://schemas.openxmlformats.org/presentationml/2006/main">
+  <p:cSld>
+    <p:spTree>
+      <p:nvGrpSpPr>
+        <p:cNvPr id="1" name=""/>
+        <p:cNvGrpSpPr/>
+        <p:nvPr/>
+      </p:nvGrpSpPr>
+      <p:grpSpPr>
+        <a:xfrm>
+          <a:off x="0" y="0"/>
+          <a:ext cx="0" cy="0"/>
+          <a:chOff x="0" y="0"/>
+          <a:chExt cx="0" cy="0"/>
+        </a:xfrm>
+      </p:grpSpPr>
+      <p:sp>
+        <p:nvSpPr>
+          <p:cNvPr id="2" name="Título 1">
+            <a:extLst>
+              <a:ext uri="{FF2B5EF4-FFF2-40B4-BE49-F238E27FC236}">
+                <a16:creationId xmlns:a16="http://schemas.microsoft.com/office/drawing/2014/main" id="{13328307-CD47-45FC-AC83-6B897F518210}"/>
+              </a:ext>
+            </a:extLst>
+          </p:cNvPr>
+          <p:cNvSpPr>
+            <a:spLocks noGrp="1"/>
+          </p:cNvSpPr>
+          <p:nvPr>
+            <p:ph type="title"/>
+          </p:nvPr>
+        </p:nvSpPr>
+        <p:spPr/>
+        <p:txBody>
+          <a:bodyPr/>
+          <a:lstStyle/>
+          <a:p>
+            <a:r>
+              <a:rPr lang="es-ES" dirty="0"/>
+              <a:t>Experiencia Personal</a:t>
+            </a:r>
+          </a:p>
+        </p:txBody>
+      </p:sp>
+      <p:sp>
+        <p:nvSpPr>
+          <p:cNvPr id="3" name="Marcador de contenido 2">
+            <a:extLst>
+              <a:ext uri="{FF2B5EF4-FFF2-40B4-BE49-F238E27FC236}">
+                <a16:creationId xmlns:a16="http://schemas.microsoft.com/office/drawing/2014/main" id="{185103BB-2019-4C7B-BBC7-353C72AF3954}"/>
+              </a:ext>
+            </a:extLst>
+          </p:cNvPr>
+          <p:cNvSpPr>
+            <a:spLocks noGrp="1"/>
+          </p:cNvSpPr>
+          <p:nvPr>
+            <p:ph idx="1"/>
+          </p:nvPr>
+        </p:nvSpPr>
+        <p:spPr/>
+        <p:txBody>
+          <a:bodyPr/>
+          <a:lstStyle/>
+          <a:p>
+            <a:r>
+              <a:rPr lang="es-ES" dirty="0"/>
+              <a:t>Experiencia muy satisfactoria.</a:t>
+            </a:r>
+          </a:p>
+          <a:p>
+            <a:r>
+              <a:rPr lang="es-ES" dirty="0"/>
+              <a:t>Aprender nuevos </a:t>
+            </a:r>
+            <a:r>
+              <a:rPr lang="es-ES" dirty="0" err="1"/>
+              <a:t>frameworks</a:t>
+            </a:r>
+            <a:r>
+              <a:rPr lang="es-ES" dirty="0"/>
+              <a:t> y tecnologías.</a:t>
+            </a:r>
+          </a:p>
+          <a:p>
+            <a:r>
+              <a:rPr lang="es-ES" dirty="0"/>
+              <a:t>Fijación a horarios y responsabilidades.</a:t>
+            </a:r>
+          </a:p>
+          <a:p>
+            <a:r>
+              <a:rPr lang="es-ES" dirty="0"/>
+              <a:t>Gran oportunidad de trabajo en la empresa CIC.</a:t>
+            </a:r>
+          </a:p>
+          <a:p>
+            <a:r>
+              <a:rPr lang="es-ES" dirty="0"/>
+              <a:t>Continuidad en CIC.</a:t>
+            </a:r>
+          </a:p>
+        </p:txBody>
+      </p:sp>
+    </p:spTree>
+    <p:extLst>
+      <p:ext uri="{BB962C8B-B14F-4D97-AF65-F5344CB8AC3E}">
+        <p14:creationId xmlns:p14="http://schemas.microsoft.com/office/powerpoint/2010/main" val="601501182"/>
+      </p:ext>
+    </p:extLst>
+  </p:cSld>
+  <p:clrMapOvr>
+    <a:masterClrMapping/>
+  </p:clrMapOvr>
+</p:sld>
+</file>
+
+<file path=ppt/slides/slide24.xml><?xml version="1.0" encoding="utf-8"?>
+<p:sld xmlns:a="http://schemas.openxmlformats.org/drawingml/2006/main" xmlns:r="http://schemas.openxmlformats.org/officeDocument/2006/relationships" xmlns:p="http://schemas.openxmlformats.org/presentationml/2006/main">
+  <p:cSld>
+    <p:spTree>
+      <p:nvGrpSpPr>
+        <p:cNvPr id="1" name=""/>
+        <p:cNvGrpSpPr/>
+        <p:nvPr/>
+      </p:nvGrpSpPr>
+      <p:grpSpPr>
+        <a:xfrm>
+          <a:off x="0" y="0"/>
+          <a:ext cx="0" cy="0"/>
+          <a:chOff x="0" y="0"/>
+          <a:chExt cx="0" cy="0"/>
+        </a:xfrm>
+      </p:grpSpPr>
+      <p:sp>
+        <p:nvSpPr>
+          <p:cNvPr id="2" name="Título 1">
+            <a:extLst>
+              <a:ext uri="{FF2B5EF4-FFF2-40B4-BE49-F238E27FC236}">
+                <a16:creationId xmlns:a16="http://schemas.microsoft.com/office/drawing/2014/main" id="{D11F44C8-6E64-4275-A153-584A50C097BC}"/>
+              </a:ext>
+            </a:extLst>
+          </p:cNvPr>
+          <p:cNvSpPr>
+            <a:spLocks noGrp="1"/>
+          </p:cNvSpPr>
+          <p:nvPr>
+            <p:ph type="title"/>
+          </p:nvPr>
+        </p:nvSpPr>
+        <p:spPr/>
+        <p:txBody>
+          <a:bodyPr/>
+          <a:lstStyle/>
+          <a:p>
+            <a:r>
+              <a:rPr lang="es-ES" dirty="0"/>
+              <a:t>Trabajos Futuros</a:t>
+            </a:r>
+          </a:p>
+        </p:txBody>
+      </p:sp>
+      <p:sp>
+        <p:nvSpPr>
+          <p:cNvPr id="3" name="Marcador de contenido 2">
+            <a:extLst>
+              <a:ext uri="{FF2B5EF4-FFF2-40B4-BE49-F238E27FC236}">
+                <a16:creationId xmlns:a16="http://schemas.microsoft.com/office/drawing/2014/main" id="{0948A6A7-253D-458A-97D5-5FD7DF3C5952}"/>
+              </a:ext>
+            </a:extLst>
+          </p:cNvPr>
+          <p:cNvSpPr>
+            <a:spLocks noGrp="1"/>
+          </p:cNvSpPr>
+          <p:nvPr>
+            <p:ph idx="1"/>
+          </p:nvPr>
+        </p:nvSpPr>
+        <p:spPr/>
+        <p:txBody>
+          <a:bodyPr/>
+          <a:lstStyle/>
+          <a:p>
+            <a:r>
+              <a:rPr lang="es-ES" dirty="0"/>
+              <a:t>Imagen de </a:t>
+            </a:r>
+            <a:r>
+              <a:rPr lang="es-ES"/>
+              <a:t>procesos anidados</a:t>
+            </a:r>
+          </a:p>
+        </p:txBody>
+      </p:sp>
+    </p:spTree>
+    <p:extLst>
+      <p:ext uri="{BB962C8B-B14F-4D97-AF65-F5344CB8AC3E}">
+        <p14:creationId xmlns:p14="http://schemas.microsoft.com/office/powerpoint/2010/main" val="4214880201"/>
+      </p:ext>
+    </p:extLst>
+  </p:cSld>
+  <p:clrMapOvr>
+    <a:masterClrMapping/>
+  </p:clrMapOvr>
+</p:sld>
+</file>
+
+<file path=ppt/slides/slide25.xml><?xml version="1.0" encoding="utf-8"?>
+<p:sld xmlns:a="http://schemas.openxmlformats.org/drawingml/2006/main" xmlns:r="http://schemas.openxmlformats.org/officeDocument/2006/relationships" xmlns:p="http://schemas.openxmlformats.org/presentationml/2006/main">
+  <p:cSld>
+    <p:spTree>
+      <p:nvGrpSpPr>
+        <p:cNvPr id="1" name=""/>
+        <p:cNvGrpSpPr/>
+        <p:nvPr/>
+      </p:nvGrpSpPr>
+      <p:grpSpPr>
+        <a:xfrm>
+          <a:off x="0" y="0"/>
+          <a:ext cx="0" cy="0"/>
+          <a:chOff x="0" y="0"/>
+          <a:chExt cx="0" cy="0"/>
+        </a:xfrm>
+      </p:grpSpPr>
+      <p:sp>
+        <p:nvSpPr>
+          <p:cNvPr id="3" name="Marcador de contenido 2">
+            <a:extLst>
+              <a:ext uri="{FF2B5EF4-FFF2-40B4-BE49-F238E27FC236}">
+                <a16:creationId xmlns:a16="http://schemas.microsoft.com/office/drawing/2014/main" id="{0FE2B617-F082-4C8F-9C46-05273E7B9294}"/>
+              </a:ext>
+            </a:extLst>
+          </p:cNvPr>
+          <p:cNvSpPr>
+            <a:spLocks noGrp="1"/>
+          </p:cNvSpPr>
+          <p:nvPr>
+            <p:ph idx="1"/>
+          </p:nvPr>
+        </p:nvSpPr>
+        <p:spPr>
+          <a:xfrm>
+            <a:off x="838200" y="4716379"/>
+            <a:ext cx="10515600" cy="1460584"/>
+          </a:xfrm>
+        </p:spPr>
+        <p:txBody>
+          <a:bodyPr/>
+          <a:lstStyle/>
+          <a:p>
+            <a:pPr marL="0" indent="0" algn="ctr">
+              <a:buNone/>
+            </a:pPr>
+            <a:r>
+              <a:rPr lang="es-ES" dirty="0"/>
+              <a:t>Ignacio Agüero Salcines</a:t>
+            </a:r>
+          </a:p>
+          <a:p>
+            <a:pPr marL="0" indent="0" algn="ctr">
+              <a:buNone/>
+            </a:pPr>
+            <a:r>
+              <a:rPr lang="es-ES" dirty="0"/>
+              <a:t>Correo electrónico: nacho.aguero@gmail.com</a:t>
+            </a:r>
+          </a:p>
+        </p:txBody>
+      </p:sp>
+      <p:sp>
+        <p:nvSpPr>
+          <p:cNvPr id="4" name="Subtítulo 2">
+            <a:extLst>
+              <a:ext uri="{FF2B5EF4-FFF2-40B4-BE49-F238E27FC236}">
+                <a16:creationId xmlns:a16="http://schemas.microsoft.com/office/drawing/2014/main" id="{A581AEE8-DA1C-4DB8-BF5A-E5A664F5DDE0}"/>
+              </a:ext>
+            </a:extLst>
+          </p:cNvPr>
+          <p:cNvSpPr txBox="1">
+            <a:spLocks/>
+          </p:cNvSpPr>
+          <p:nvPr/>
+        </p:nvSpPr>
+        <p:spPr>
+          <a:xfrm>
+            <a:off x="1524000" y="3429000"/>
+            <a:ext cx="9144000" cy="542123"/>
+          </a:xfrm>
+          <a:prstGeom prst="rect">
+            <a:avLst/>
+          </a:prstGeom>
+        </p:spPr>
+        <p:txBody>
+          <a:bodyPr vert="horz" lIns="91440" tIns="45720" rIns="91440" bIns="45720" rtlCol="0">
+            <a:normAutofit/>
+          </a:bodyPr>
+          <a:lstStyle>
+            <a:lvl1pPr marL="228600" indent="-228600" algn="l" defTabSz="914400" rtl="0" eaLnBrk="1" latinLnBrk="0" hangingPunct="1">
+              <a:lnSpc>
+                <a:spcPct val="90000"/>
+              </a:lnSpc>
+              <a:spcBef>
+                <a:spcPts val="1000"/>
+              </a:spcBef>
+              <a:buFont typeface="Arial" panose="020B0604020202020204" pitchFamily="34" charset="0"/>
+              <a:buChar char="•"/>
+              <a:defRPr sz="2800" kern="1200">
+                <a:solidFill>
+                  <a:schemeClr val="tx1"/>
+                </a:solidFill>
+                <a:latin typeface="+mn-lt"/>
+                <a:ea typeface="+mn-ea"/>
+                <a:cs typeface="+mn-cs"/>
+              </a:defRPr>
+            </a:lvl1pPr>
+            <a:lvl2pPr marL="685800" indent="-228600" algn="l" defTabSz="914400" rtl="0" eaLnBrk="1" latinLnBrk="0" hangingPunct="1">
+              <a:lnSpc>
+                <a:spcPct val="90000"/>
+              </a:lnSpc>
+              <a:spcBef>
+                <a:spcPts val="500"/>
+              </a:spcBef>
+              <a:buFont typeface="Arial" panose="020B0604020202020204" pitchFamily="34" charset="0"/>
+              <a:buChar char="•"/>
+              <a:defRPr sz="2400" kern="1200">
+                <a:solidFill>
+                  <a:schemeClr val="tx1"/>
+                </a:solidFill>
+                <a:latin typeface="+mn-lt"/>
+                <a:ea typeface="+mn-ea"/>
+                <a:cs typeface="+mn-cs"/>
+              </a:defRPr>
+            </a:lvl2pPr>
+            <a:lvl3pPr marL="1143000" indent="-228600" algn="l" defTabSz="914400" rtl="0" eaLnBrk="1" latinLnBrk="0" hangingPunct="1">
+              <a:lnSpc>
+                <a:spcPct val="90000"/>
+              </a:lnSpc>
+              <a:spcBef>
+                <a:spcPts val="500"/>
+              </a:spcBef>
+              <a:buFont typeface="Arial" panose="020B0604020202020204" pitchFamily="34" charset="0"/>
+              <a:buChar char="•"/>
+              <a:defRPr sz="2000" kern="1200">
+                <a:solidFill>
+                  <a:schemeClr val="tx1"/>
+                </a:solidFill>
+                <a:latin typeface="+mn-lt"/>
+                <a:ea typeface="+mn-ea"/>
+                <a:cs typeface="+mn-cs"/>
+              </a:defRPr>
+            </a:lvl3pPr>
+            <a:lvl4pPr marL="1600200" indent="-228600" algn="l" defTabSz="914400" rtl="0" eaLnBrk="1" latinLnBrk="0" hangingPunct="1">
+              <a:lnSpc>
+                <a:spcPct val="90000"/>
+              </a:lnSpc>
+              <a:spcBef>
+                <a:spcPts val="500"/>
+              </a:spcBef>
+              <a:buFont typeface="Arial" panose="020B0604020202020204" pitchFamily="34" charset="0"/>
+              <a:buChar char="•"/>
+              <a:defRPr sz="1800" kern="1200">
+                <a:solidFill>
+                  <a:schemeClr val="tx1"/>
+                </a:solidFill>
+                <a:latin typeface="+mn-lt"/>
+                <a:ea typeface="+mn-ea"/>
+                <a:cs typeface="+mn-cs"/>
+              </a:defRPr>
+            </a:lvl4pPr>
+            <a:lvl5pPr marL="2057400" indent="-228600" algn="l" defTabSz="914400" rtl="0" eaLnBrk="1" latinLnBrk="0" hangingPunct="1">
+              <a:lnSpc>
+                <a:spcPct val="90000"/>
+              </a:lnSpc>
+              <a:spcBef>
+                <a:spcPts val="500"/>
+              </a:spcBef>
+              <a:buFont typeface="Arial" panose="020B0604020202020204" pitchFamily="34" charset="0"/>
+              <a:buChar char="•"/>
+              <a:defRPr sz="1800" kern="1200">
+                <a:solidFill>
+                  <a:schemeClr val="tx1"/>
+                </a:solidFill>
+                <a:latin typeface="+mn-lt"/>
+                <a:ea typeface="+mn-ea"/>
+                <a:cs typeface="+mn-cs"/>
+              </a:defRPr>
+            </a:lvl5pPr>
+            <a:lvl6pPr marL="2514600" indent="-228600" algn="l" defTabSz="914400" rtl="0" eaLnBrk="1" latinLnBrk="0" hangingPunct="1">
+              <a:lnSpc>
+                <a:spcPct val="90000"/>
+              </a:lnSpc>
+              <a:spcBef>
+                <a:spcPts val="500"/>
+              </a:spcBef>
+              <a:buFont typeface="Arial" panose="020B0604020202020204" pitchFamily="34" charset="0"/>
+              <a:buChar char="•"/>
+              <a:defRPr sz="1800" kern="1200">
+                <a:solidFill>
+                  <a:schemeClr val="tx1"/>
+                </a:solidFill>
+                <a:latin typeface="+mn-lt"/>
+                <a:ea typeface="+mn-ea"/>
+                <a:cs typeface="+mn-cs"/>
+              </a:defRPr>
+            </a:lvl6pPr>
+            <a:lvl7pPr marL="2971800" indent="-228600" algn="l" defTabSz="914400" rtl="0" eaLnBrk="1" latinLnBrk="0" hangingPunct="1">
+              <a:lnSpc>
+                <a:spcPct val="90000"/>
+              </a:lnSpc>
+              <a:spcBef>
+                <a:spcPts val="500"/>
+              </a:spcBef>
+              <a:buFont typeface="Arial" panose="020B0604020202020204" pitchFamily="34" charset="0"/>
+              <a:buChar char="•"/>
+              <a:defRPr sz="1800" kern="1200">
+                <a:solidFill>
+                  <a:schemeClr val="tx1"/>
+                </a:solidFill>
+                <a:latin typeface="+mn-lt"/>
+                <a:ea typeface="+mn-ea"/>
+                <a:cs typeface="+mn-cs"/>
+              </a:defRPr>
+            </a:lvl7pPr>
+            <a:lvl8pPr marL="3429000" indent="-228600" algn="l" defTabSz="914400" rtl="0" eaLnBrk="1" latinLnBrk="0" hangingPunct="1">
+              <a:lnSpc>
+                <a:spcPct val="90000"/>
+              </a:lnSpc>
+              <a:spcBef>
+                <a:spcPts val="500"/>
+              </a:spcBef>
+              <a:buFont typeface="Arial" panose="020B0604020202020204" pitchFamily="34" charset="0"/>
+              <a:buChar char="•"/>
+              <a:defRPr sz="1800" kern="1200">
+                <a:solidFill>
+                  <a:schemeClr val="tx1"/>
+                </a:solidFill>
+                <a:latin typeface="+mn-lt"/>
+                <a:ea typeface="+mn-ea"/>
+                <a:cs typeface="+mn-cs"/>
+              </a:defRPr>
+            </a:lvl8pPr>
+            <a:lvl9pPr marL="3886200" indent="-228600" algn="l" defTabSz="914400" rtl="0" eaLnBrk="1" latinLnBrk="0" hangingPunct="1">
+              <a:lnSpc>
+                <a:spcPct val="90000"/>
+              </a:lnSpc>
+              <a:spcBef>
+                <a:spcPts val="500"/>
+              </a:spcBef>
+              <a:buFont typeface="Arial" panose="020B0604020202020204" pitchFamily="34" charset="0"/>
+              <a:buChar char="•"/>
+              <a:defRPr sz="1800" kern="1200">
+                <a:solidFill>
+                  <a:schemeClr val="tx1"/>
+                </a:solidFill>
+                <a:latin typeface="+mn-lt"/>
+                <a:ea typeface="+mn-ea"/>
+                <a:cs typeface="+mn-cs"/>
+              </a:defRPr>
+            </a:lvl9pPr>
+          </a:lstStyle>
+          <a:p>
+            <a:pPr marL="0" indent="0" algn="ctr">
+              <a:buNone/>
+            </a:pPr>
+            <a:r>
+              <a:rPr lang="en-US" dirty="0"/>
+              <a:t>(Graphic Specification of Data Recovery Processes in LUCA) </a:t>
+            </a:r>
+            <a:endParaRPr lang="es-ES" dirty="0"/>
+          </a:p>
+        </p:txBody>
+      </p:sp>
+      <p:sp>
+        <p:nvSpPr>
+          <p:cNvPr id="7" name="Título 1">
+            <a:extLst>
+              <a:ext uri="{FF2B5EF4-FFF2-40B4-BE49-F238E27FC236}">
+                <a16:creationId xmlns:a16="http://schemas.microsoft.com/office/drawing/2014/main" id="{D5948A46-E61E-4825-8DA7-2DC690CA0A34}"/>
+              </a:ext>
+            </a:extLst>
+          </p:cNvPr>
+          <p:cNvSpPr txBox="1">
+            <a:spLocks/>
+          </p:cNvSpPr>
+          <p:nvPr/>
+        </p:nvSpPr>
+        <p:spPr>
+          <a:xfrm>
+            <a:off x="1524000" y="656221"/>
+            <a:ext cx="9144000" cy="2387600"/>
+          </a:xfrm>
+          <a:prstGeom prst="rect">
+            <a:avLst/>
+          </a:prstGeom>
+        </p:spPr>
+        <p:txBody>
+          <a:bodyPr vert="horz" lIns="91440" tIns="45720" rIns="91440" bIns="45720" rtlCol="0" anchor="ctr">
+            <a:normAutofit fontScale="97500"/>
+          </a:bodyPr>
+          <a:lstStyle>
+            <a:lvl1pPr algn="l" defTabSz="914400" rtl="0" eaLnBrk="1" latinLnBrk="0" hangingPunct="1">
+              <a:lnSpc>
+                <a:spcPct val="90000"/>
+              </a:lnSpc>
+              <a:spcBef>
+                <a:spcPct val="0"/>
+              </a:spcBef>
+              <a:buNone/>
+              <a:defRPr sz="4400" kern="1200">
+                <a:solidFill>
+                  <a:schemeClr val="tx1"/>
+                </a:solidFill>
+                <a:latin typeface="+mj-lt"/>
+                <a:ea typeface="+mj-ea"/>
+                <a:cs typeface="+mj-cs"/>
+              </a:defRPr>
+            </a:lvl1pPr>
+          </a:lstStyle>
+          <a:p>
+            <a:pPr algn="ctr"/>
+            <a:r>
+              <a:rPr lang="es-ES" sz="5400" dirty="0"/>
+              <a:t>Especificación Gráfica de Procesos de Recuperación de Datos en LUCA</a:t>
+            </a:r>
+          </a:p>
+        </p:txBody>
+      </p:sp>
+      <p:pic>
+        <p:nvPicPr>
+          <p:cNvPr id="8" name="Picture 2" descr="logoUnicanGrande">
+            <a:extLst>
+              <a:ext uri="{FF2B5EF4-FFF2-40B4-BE49-F238E27FC236}">
+                <a16:creationId xmlns:a16="http://schemas.microsoft.com/office/drawing/2014/main" id="{53CB8D41-7752-43E0-8727-7A0DECDD31C8}"/>
+              </a:ext>
+            </a:extLst>
+          </p:cNvPr>
+          <p:cNvPicPr>
+            <a:picLocks noChangeAspect="1" noChangeArrowheads="1"/>
+          </p:cNvPicPr>
+          <p:nvPr/>
+        </p:nvPicPr>
+        <p:blipFill>
+          <a:blip r:embed="rId2">
+            <a:extLst>
+              <a:ext uri="{28A0092B-C50C-407E-A947-70E740481C1C}">
+                <a14:useLocalDpi xmlns:a14="http://schemas.microsoft.com/office/drawing/2010/main" val="0"/>
+              </a:ext>
+            </a:extLst>
+          </a:blip>
+          <a:srcRect/>
+          <a:stretch>
+            <a:fillRect/>
+          </a:stretch>
+        </p:blipFill>
+        <p:spPr bwMode="auto">
+          <a:xfrm>
+            <a:off x="452633" y="340665"/>
+            <a:ext cx="1170894" cy="1189189"/>
+          </a:xfrm>
+          <a:prstGeom prst="rect">
+            <a:avLst/>
+          </a:prstGeom>
+          <a:noFill/>
+          <a:ln>
+            <a:noFill/>
+          </a:ln>
+          <a:extLst>
+            <a:ext uri="{909E8E84-426E-40DD-AFC4-6F175D3DCCD1}">
+              <a14:hiddenFill xmlns:a14="http://schemas.microsoft.com/office/drawing/2010/main">
+                <a:solidFill>
+                  <a:srgbClr val="FFFFFF"/>
+                </a:solidFill>
+              </a14:hiddenFill>
+            </a:ext>
+            <a:ext uri="{91240B29-F687-4F45-9708-019B960494DF}">
+              <a14:hiddenLine xmlns:a14="http://schemas.microsoft.com/office/drawing/2010/main" w="9525">
+                <a:solidFill>
+                  <a:srgbClr val="000000"/>
+                </a:solidFill>
+                <a:miter lim="800000"/>
+                <a:headEnd/>
+                <a:tailEnd/>
+              </a14:hiddenLine>
+            </a:ext>
+          </a:extLst>
+        </p:spPr>
+      </p:pic>
+    </p:spTree>
+    <p:extLst>
+      <p:ext uri="{BB962C8B-B14F-4D97-AF65-F5344CB8AC3E}">
+        <p14:creationId xmlns:p14="http://schemas.microsoft.com/office/powerpoint/2010/main" val="479486940"/>
       </p:ext>
     </p:extLst>
   </p:cSld>
@@ -3610,10 +5678,9 @@
           <a:lstStyle/>
           <a:p>
             <a:r>
-              <a:rPr lang="es-ES" dirty="0" smtClean="0"/>
+              <a:rPr lang="es-ES" dirty="0"/>
               <a:t>Objetivo del Proyecto</a:t>
             </a:r>
-            <a:endParaRPr lang="es-ES" dirty="0"/>
           </a:p>
         </p:txBody>
       </p:sp>
@@ -3633,31 +5700,27 @@
           <a:lstStyle/>
           <a:p>
             <a:r>
-              <a:rPr lang="es-ES" dirty="0" smtClean="0"/>
+              <a:rPr lang="es-ES" dirty="0"/>
               <a:t>Realizado en CIC</a:t>
             </a:r>
           </a:p>
           <a:p>
             <a:r>
-              <a:rPr lang="es-ES" dirty="0" smtClean="0"/>
+              <a:rPr lang="es-ES" dirty="0"/>
               <a:t>Proyecto LUCA</a:t>
             </a:r>
           </a:p>
           <a:p>
             <a:r>
-              <a:rPr lang="es-ES" dirty="0" smtClean="0"/>
+              <a:rPr lang="es-ES" dirty="0"/>
               <a:t>Fechas </a:t>
             </a:r>
           </a:p>
           <a:p>
-            <a:pPr marL="0" indent="0">
-              <a:buNone/>
-            </a:pPr>
-            <a:r>
-              <a:rPr lang="es-ES" dirty="0" smtClean="0"/>
-              <a:t>* Destacado, frase resumiendo el objetivo del proyecto.</a:t>
-            </a:r>
-            <a:endParaRPr lang="es-ES" dirty="0"/>
+            <a:r>
+              <a:rPr lang="es-ES" dirty="0"/>
+              <a:t>Destacado, frase resumiendo el objetivo del proyecto.</a:t>
+            </a:r>
           </a:p>
         </p:txBody>
       </p:sp>
@@ -3707,10 +5770,9 @@
           <a:lstStyle/>
           <a:p>
             <a:r>
-              <a:rPr lang="es-ES" smtClean="0"/>
-              <a:t>LUCA</a:t>
-            </a:r>
-            <a:endParaRPr lang="es-ES"/>
+              <a:rPr lang="es-ES" dirty="0"/>
+              <a:t>Antecedentes: LUCA</a:t>
+            </a:r>
           </a:p>
         </p:txBody>
       </p:sp>
@@ -3724,12 +5786,54 @@
             <p:ph idx="1"/>
           </p:nvPr>
         </p:nvSpPr>
-        <p:spPr/>
-        <p:txBody>
-          <a:bodyPr/>
-          <a:lstStyle/>
-          <a:p>
-            <a:endParaRPr lang="es-ES"/>
+        <p:spPr>
+          <a:xfrm>
+            <a:off x="838200" y="1825625"/>
+            <a:ext cx="10515600" cy="4516452"/>
+          </a:xfrm>
+        </p:spPr>
+        <p:txBody>
+          <a:bodyPr>
+            <a:normAutofit/>
+          </a:bodyPr>
+          <a:lstStyle/>
+          <a:p>
+            <a:r>
+              <a:rPr lang="es-ES" dirty="0"/>
+              <a:t>Centralizar el acceso a los recursos</a:t>
+            </a:r>
+          </a:p>
+          <a:p>
+            <a:r>
+              <a:rPr lang="es-ES" dirty="0"/>
+              <a:t>Automatizar el proceso de recuperación de datos</a:t>
+            </a:r>
+          </a:p>
+          <a:p>
+            <a:endParaRPr lang="es-ES" dirty="0"/>
+          </a:p>
+          <a:p>
+            <a:r>
+              <a:rPr lang="es-ES" dirty="0"/>
+              <a:t>Dos roles de usuario:</a:t>
+            </a:r>
+          </a:p>
+          <a:p>
+            <a:pPr lvl="1"/>
+            <a:r>
+              <a:rPr lang="es-ES" dirty="0"/>
+              <a:t>Gestor de consultas</a:t>
+            </a:r>
+          </a:p>
+          <a:p>
+            <a:pPr lvl="1"/>
+            <a:r>
+              <a:rPr lang="es-ES" dirty="0"/>
+              <a:t>Ejecutor de consultas</a:t>
+            </a:r>
+          </a:p>
+          <a:p>
+            <a:endParaRPr lang="es-ES" dirty="0"/>
           </a:p>
         </p:txBody>
       </p:sp>
@@ -3737,6 +5841,464 @@
     <p:extLst>
       <p:ext uri="{BB962C8B-B14F-4D97-AF65-F5344CB8AC3E}">
         <p14:creationId xmlns:p14="http://schemas.microsoft.com/office/powerpoint/2010/main" val="3559109023"/>
+      </p:ext>
+    </p:extLst>
+  </p:cSld>
+  <p:clrMapOvr>
+    <a:masterClrMapping/>
+  </p:clrMapOvr>
+</p:sld>
+</file>
+
+<file path=ppt/slides/slide5.xml><?xml version="1.0" encoding="utf-8"?>
+<p:sld xmlns:a="http://schemas.openxmlformats.org/drawingml/2006/main" xmlns:r="http://schemas.openxmlformats.org/officeDocument/2006/relationships" xmlns:p="http://schemas.openxmlformats.org/presentationml/2006/main">
+  <p:cSld>
+    <p:spTree>
+      <p:nvGrpSpPr>
+        <p:cNvPr id="1" name=""/>
+        <p:cNvGrpSpPr/>
+        <p:nvPr/>
+      </p:nvGrpSpPr>
+      <p:grpSpPr>
+        <a:xfrm>
+          <a:off x="0" y="0"/>
+          <a:ext cx="0" cy="0"/>
+          <a:chOff x="0" y="0"/>
+          <a:chExt cx="0" cy="0"/>
+        </a:xfrm>
+      </p:grpSpPr>
+      <p:sp>
+        <p:nvSpPr>
+          <p:cNvPr id="2" name="Título 1">
+            <a:extLst>
+              <a:ext uri="{FF2B5EF4-FFF2-40B4-BE49-F238E27FC236}">
+                <a16:creationId xmlns:a16="http://schemas.microsoft.com/office/drawing/2014/main" id="{175CA6E5-395E-4BEE-BB6B-972579FE67E6}"/>
+              </a:ext>
+            </a:extLst>
+          </p:cNvPr>
+          <p:cNvSpPr>
+            <a:spLocks noGrp="1"/>
+          </p:cNvSpPr>
+          <p:nvPr>
+            <p:ph type="title"/>
+          </p:nvPr>
+        </p:nvSpPr>
+        <p:spPr/>
+        <p:txBody>
+          <a:bodyPr/>
+          <a:lstStyle/>
+          <a:p>
+            <a:r>
+              <a:rPr lang="es-ES" dirty="0"/>
+              <a:t>Video de ejecución de una consulta</a:t>
+            </a:r>
+          </a:p>
+        </p:txBody>
+      </p:sp>
+    </p:spTree>
+    <p:extLst>
+      <p:ext uri="{BB962C8B-B14F-4D97-AF65-F5344CB8AC3E}">
+        <p14:creationId xmlns:p14="http://schemas.microsoft.com/office/powerpoint/2010/main" val="2145991470"/>
+      </p:ext>
+    </p:extLst>
+  </p:cSld>
+  <p:clrMapOvr>
+    <a:masterClrMapping/>
+  </p:clrMapOvr>
+</p:sld>
+</file>
+
+<file path=ppt/slides/slide6.xml><?xml version="1.0" encoding="utf-8"?>
+<p:sld xmlns:a="http://schemas.openxmlformats.org/drawingml/2006/main" xmlns:r="http://schemas.openxmlformats.org/officeDocument/2006/relationships" xmlns:p="http://schemas.openxmlformats.org/presentationml/2006/main">
+  <p:cSld>
+    <p:spTree>
+      <p:nvGrpSpPr>
+        <p:cNvPr id="1" name=""/>
+        <p:cNvGrpSpPr/>
+        <p:nvPr/>
+      </p:nvGrpSpPr>
+      <p:grpSpPr>
+        <a:xfrm>
+          <a:off x="0" y="0"/>
+          <a:ext cx="0" cy="0"/>
+          <a:chOff x="0" y="0"/>
+          <a:chExt cx="0" cy="0"/>
+        </a:xfrm>
+      </p:grpSpPr>
+      <p:sp>
+        <p:nvSpPr>
+          <p:cNvPr id="2" name="Título 1">
+            <a:extLst>
+              <a:ext uri="{FF2B5EF4-FFF2-40B4-BE49-F238E27FC236}">
+                <a16:creationId xmlns:a16="http://schemas.microsoft.com/office/drawing/2014/main" id="{49761F0F-2D31-42D7-939F-961BF0337DD5}"/>
+              </a:ext>
+            </a:extLst>
+          </p:cNvPr>
+          <p:cNvSpPr>
+            <a:spLocks noGrp="1"/>
+          </p:cNvSpPr>
+          <p:nvPr>
+            <p:ph type="title"/>
+          </p:nvPr>
+        </p:nvSpPr>
+        <p:spPr/>
+        <p:txBody>
+          <a:bodyPr/>
+          <a:lstStyle/>
+          <a:p>
+            <a:r>
+              <a:rPr lang="es-ES" dirty="0"/>
+              <a:t>Motivación</a:t>
+            </a:r>
+          </a:p>
+        </p:txBody>
+      </p:sp>
+      <p:sp>
+        <p:nvSpPr>
+          <p:cNvPr id="3" name="Marcador de contenido 2">
+            <a:extLst>
+              <a:ext uri="{FF2B5EF4-FFF2-40B4-BE49-F238E27FC236}">
+                <a16:creationId xmlns:a16="http://schemas.microsoft.com/office/drawing/2014/main" id="{5A1E0768-DCC3-43BE-B717-670C448A012D}"/>
+              </a:ext>
+            </a:extLst>
+          </p:cNvPr>
+          <p:cNvSpPr>
+            <a:spLocks noGrp="1"/>
+          </p:cNvSpPr>
+          <p:nvPr>
+            <p:ph idx="1"/>
+          </p:nvPr>
+        </p:nvSpPr>
+        <p:spPr/>
+        <p:txBody>
+          <a:bodyPr/>
+          <a:lstStyle/>
+          <a:p>
+            <a:r>
+              <a:rPr lang="es-ES" dirty="0"/>
+              <a:t>Imagen de interacción del usuario para hacer un proceso</a:t>
+            </a:r>
+          </a:p>
+        </p:txBody>
+      </p:sp>
+    </p:spTree>
+    <p:extLst>
+      <p:ext uri="{BB962C8B-B14F-4D97-AF65-F5344CB8AC3E}">
+        <p14:creationId xmlns:p14="http://schemas.microsoft.com/office/powerpoint/2010/main" val="3998703166"/>
+      </p:ext>
+    </p:extLst>
+  </p:cSld>
+  <p:clrMapOvr>
+    <a:masterClrMapping/>
+  </p:clrMapOvr>
+</p:sld>
+</file>
+
+<file path=ppt/slides/slide7.xml><?xml version="1.0" encoding="utf-8"?>
+<p:sld xmlns:a="http://schemas.openxmlformats.org/drawingml/2006/main" xmlns:r="http://schemas.openxmlformats.org/officeDocument/2006/relationships" xmlns:p="http://schemas.openxmlformats.org/presentationml/2006/main">
+  <p:cSld>
+    <p:spTree>
+      <p:nvGrpSpPr>
+        <p:cNvPr id="1" name=""/>
+        <p:cNvGrpSpPr/>
+        <p:nvPr/>
+      </p:nvGrpSpPr>
+      <p:grpSpPr>
+        <a:xfrm>
+          <a:off x="0" y="0"/>
+          <a:ext cx="0" cy="0"/>
+          <a:chOff x="0" y="0"/>
+          <a:chExt cx="0" cy="0"/>
+        </a:xfrm>
+      </p:grpSpPr>
+      <p:sp>
+        <p:nvSpPr>
+          <p:cNvPr id="2" name="Título 1">
+            <a:extLst>
+              <a:ext uri="{FF2B5EF4-FFF2-40B4-BE49-F238E27FC236}">
+                <a16:creationId xmlns:a16="http://schemas.microsoft.com/office/drawing/2014/main" id="{A25AF4AC-1DA0-4364-9280-307A38C0A886}"/>
+              </a:ext>
+            </a:extLst>
+          </p:cNvPr>
+          <p:cNvSpPr>
+            <a:spLocks noGrp="1"/>
+          </p:cNvSpPr>
+          <p:nvPr>
+            <p:ph type="title"/>
+          </p:nvPr>
+        </p:nvSpPr>
+        <p:spPr/>
+        <p:txBody>
+          <a:bodyPr/>
+          <a:lstStyle/>
+          <a:p>
+            <a:r>
+              <a:rPr lang="es-ES" dirty="0"/>
+              <a:t>Objetivos del proyecto</a:t>
+            </a:r>
+          </a:p>
+        </p:txBody>
+      </p:sp>
+      <p:sp>
+        <p:nvSpPr>
+          <p:cNvPr id="3" name="Marcador de contenido 2">
+            <a:extLst>
+              <a:ext uri="{FF2B5EF4-FFF2-40B4-BE49-F238E27FC236}">
+                <a16:creationId xmlns:a16="http://schemas.microsoft.com/office/drawing/2014/main" id="{07D84FB2-9CDE-4334-9AEB-FC53EC49C306}"/>
+              </a:ext>
+            </a:extLst>
+          </p:cNvPr>
+          <p:cNvSpPr>
+            <a:spLocks noGrp="1"/>
+          </p:cNvSpPr>
+          <p:nvPr>
+            <p:ph idx="1"/>
+          </p:nvPr>
+        </p:nvSpPr>
+        <p:spPr/>
+        <p:txBody>
+          <a:bodyPr/>
+          <a:lstStyle/>
+          <a:p>
+            <a:r>
+              <a:rPr lang="es-ES" dirty="0"/>
+              <a:t>Especificación Gráfica de procesos</a:t>
+            </a:r>
+          </a:p>
+          <a:p>
+            <a:r>
+              <a:rPr lang="es-ES" dirty="0"/>
+              <a:t>Ejecución de procesos</a:t>
+            </a:r>
+          </a:p>
+          <a:p>
+            <a:r>
+              <a:rPr lang="es-ES" dirty="0"/>
+              <a:t>Obtención de información paso a paso de la ejecución</a:t>
+            </a:r>
+          </a:p>
+          <a:p>
+            <a:r>
+              <a:rPr lang="es-ES" dirty="0"/>
+              <a:t>Exportación de resultados obtenidos</a:t>
+            </a:r>
+          </a:p>
+        </p:txBody>
+      </p:sp>
+    </p:spTree>
+    <p:extLst>
+      <p:ext uri="{BB962C8B-B14F-4D97-AF65-F5344CB8AC3E}">
+        <p14:creationId xmlns:p14="http://schemas.microsoft.com/office/powerpoint/2010/main" val="2165382965"/>
+      </p:ext>
+    </p:extLst>
+  </p:cSld>
+  <p:clrMapOvr>
+    <a:masterClrMapping/>
+  </p:clrMapOvr>
+</p:sld>
+</file>
+
+<file path=ppt/slides/slide8.xml><?xml version="1.0" encoding="utf-8"?>
+<p:sld xmlns:a="http://schemas.openxmlformats.org/drawingml/2006/main" xmlns:r="http://schemas.openxmlformats.org/officeDocument/2006/relationships" xmlns:p="http://schemas.openxmlformats.org/presentationml/2006/main">
+  <p:cSld>
+    <p:spTree>
+      <p:nvGrpSpPr>
+        <p:cNvPr id="1" name=""/>
+        <p:cNvGrpSpPr/>
+        <p:nvPr/>
+      </p:nvGrpSpPr>
+      <p:grpSpPr>
+        <a:xfrm>
+          <a:off x="0" y="0"/>
+          <a:ext cx="0" cy="0"/>
+          <a:chOff x="0" y="0"/>
+          <a:chExt cx="0" cy="0"/>
+        </a:xfrm>
+      </p:grpSpPr>
+      <p:sp>
+        <p:nvSpPr>
+          <p:cNvPr id="2" name="Título 1">
+            <a:extLst>
+              <a:ext uri="{FF2B5EF4-FFF2-40B4-BE49-F238E27FC236}">
+                <a16:creationId xmlns:a16="http://schemas.microsoft.com/office/drawing/2014/main" id="{4123E9E1-7CE0-472D-B155-D74FB33C431E}"/>
+              </a:ext>
+            </a:extLst>
+          </p:cNvPr>
+          <p:cNvSpPr>
+            <a:spLocks noGrp="1"/>
+          </p:cNvSpPr>
+          <p:nvPr>
+            <p:ph type="title"/>
+          </p:nvPr>
+        </p:nvSpPr>
+        <p:spPr>
+          <a:xfrm>
+            <a:off x="838200" y="365125"/>
+            <a:ext cx="10515600" cy="1325563"/>
+          </a:xfrm>
+        </p:spPr>
+        <p:txBody>
+          <a:bodyPr/>
+          <a:lstStyle/>
+          <a:p>
+            <a:r>
+              <a:rPr lang="es-ES" dirty="0"/>
+              <a:t>Requisitos</a:t>
+            </a:r>
+          </a:p>
+        </p:txBody>
+      </p:sp>
+      <p:sp>
+        <p:nvSpPr>
+          <p:cNvPr id="3" name="Marcador de contenido 2">
+            <a:extLst>
+              <a:ext uri="{FF2B5EF4-FFF2-40B4-BE49-F238E27FC236}">
+                <a16:creationId xmlns:a16="http://schemas.microsoft.com/office/drawing/2014/main" id="{A84D1D9B-F5BD-4EEF-9E76-A11B6785E712}"/>
+              </a:ext>
+            </a:extLst>
+          </p:cNvPr>
+          <p:cNvSpPr>
+            <a:spLocks noGrp="1"/>
+          </p:cNvSpPr>
+          <p:nvPr>
+            <p:ph idx="1"/>
+          </p:nvPr>
+        </p:nvSpPr>
+        <p:spPr>
+          <a:xfrm>
+            <a:off x="838200" y="1825625"/>
+            <a:ext cx="10515600" cy="4351338"/>
+          </a:xfrm>
+        </p:spPr>
+        <p:txBody>
+          <a:bodyPr/>
+          <a:lstStyle/>
+          <a:p>
+            <a:r>
+              <a:rPr lang="es-ES" dirty="0"/>
+              <a:t>Especificados previamente al inicio del proyecto</a:t>
+            </a:r>
+          </a:p>
+          <a:p>
+            <a:pPr lvl="1"/>
+            <a:r>
+              <a:rPr lang="es-ES" dirty="0"/>
+              <a:t>Anidación gráfica de consultas</a:t>
+            </a:r>
+          </a:p>
+          <a:p>
+            <a:pPr lvl="1"/>
+            <a:r>
+              <a:rPr lang="es-ES" dirty="0"/>
+              <a:t>Ejecución de consultas en cadena</a:t>
+            </a:r>
+          </a:p>
+          <a:p>
+            <a:pPr lvl="1"/>
+            <a:r>
+              <a:rPr lang="es-ES" dirty="0"/>
+              <a:t>Actualización del gráfico</a:t>
+            </a:r>
+          </a:p>
+          <a:p>
+            <a:pPr lvl="1"/>
+            <a:endParaRPr lang="es-ES" dirty="0"/>
+          </a:p>
+        </p:txBody>
+      </p:sp>
+    </p:spTree>
+    <p:extLst>
+      <p:ext uri="{BB962C8B-B14F-4D97-AF65-F5344CB8AC3E}">
+        <p14:creationId xmlns:p14="http://schemas.microsoft.com/office/powerpoint/2010/main" val="3325899955"/>
+      </p:ext>
+    </p:extLst>
+  </p:cSld>
+  <p:clrMapOvr>
+    <a:masterClrMapping/>
+  </p:clrMapOvr>
+</p:sld>
+</file>
+
+<file path=ppt/slides/slide9.xml><?xml version="1.0" encoding="utf-8"?>
+<p:sld xmlns:a="http://schemas.openxmlformats.org/drawingml/2006/main" xmlns:r="http://schemas.openxmlformats.org/officeDocument/2006/relationships" xmlns:p="http://schemas.openxmlformats.org/presentationml/2006/main">
+  <p:cSld>
+    <p:spTree>
+      <p:nvGrpSpPr>
+        <p:cNvPr id="1" name=""/>
+        <p:cNvGrpSpPr/>
+        <p:nvPr/>
+      </p:nvGrpSpPr>
+      <p:grpSpPr>
+        <a:xfrm>
+          <a:off x="0" y="0"/>
+          <a:ext cx="0" cy="0"/>
+          <a:chOff x="0" y="0"/>
+          <a:chExt cx="0" cy="0"/>
+        </a:xfrm>
+      </p:grpSpPr>
+      <p:sp>
+        <p:nvSpPr>
+          <p:cNvPr id="2" name="Título 1">
+            <a:extLst>
+              <a:ext uri="{FF2B5EF4-FFF2-40B4-BE49-F238E27FC236}">
+                <a16:creationId xmlns:a16="http://schemas.microsoft.com/office/drawing/2014/main" id="{62D1BC97-EFE0-4399-89BE-C9F0C0188615}"/>
+              </a:ext>
+            </a:extLst>
+          </p:cNvPr>
+          <p:cNvSpPr>
+            <a:spLocks noGrp="1"/>
+          </p:cNvSpPr>
+          <p:nvPr>
+            <p:ph type="title"/>
+          </p:nvPr>
+        </p:nvSpPr>
+        <p:spPr/>
+        <p:txBody>
+          <a:bodyPr/>
+          <a:lstStyle/>
+          <a:p>
+            <a:r>
+              <a:rPr lang="es-ES" dirty="0"/>
+              <a:t>Arquitectura</a:t>
+            </a:r>
+          </a:p>
+        </p:txBody>
+      </p:sp>
+      <p:sp>
+        <p:nvSpPr>
+          <p:cNvPr id="3" name="Marcador de contenido 2">
+            <a:extLst>
+              <a:ext uri="{FF2B5EF4-FFF2-40B4-BE49-F238E27FC236}">
+                <a16:creationId xmlns:a16="http://schemas.microsoft.com/office/drawing/2014/main" id="{682454F1-5793-4E9C-8726-E475E2A46FC2}"/>
+              </a:ext>
+            </a:extLst>
+          </p:cNvPr>
+          <p:cNvSpPr>
+            <a:spLocks noGrp="1"/>
+          </p:cNvSpPr>
+          <p:nvPr>
+            <p:ph idx="1"/>
+          </p:nvPr>
+        </p:nvSpPr>
+        <p:spPr/>
+        <p:txBody>
+          <a:bodyPr/>
+          <a:lstStyle/>
+          <a:p>
+            <a:r>
+              <a:rPr lang="es-ES" dirty="0"/>
+              <a:t>Imagen de operación de listado de consultas</a:t>
+            </a:r>
+          </a:p>
+          <a:p>
+            <a:endParaRPr lang="es-ES" dirty="0"/>
+          </a:p>
+        </p:txBody>
+      </p:sp>
+    </p:spTree>
+    <p:extLst>
+      <p:ext uri="{BB962C8B-B14F-4D97-AF65-F5344CB8AC3E}">
+        <p14:creationId xmlns:p14="http://schemas.microsoft.com/office/powerpoint/2010/main" val="3473030577"/>
       </p:ext>
     </p:extLst>
   </p:cSld>

</xml_diff>

<commit_message>
descripcion hasta la planificacion
editor grafico incluido
</commit_message>
<xml_diff>
--- a/presentacion/Presentació1.pptx
+++ b/presentacion/Presentació1.pptx
@@ -283,7 +283,7 @@
           <a:p>
             <a:fld id="{C947F3CF-587E-45B4-8FCF-EDFCE467AEF1}" type="datetimeFigureOut">
               <a:rPr lang="es-ES" smtClean="0"/>
-              <a:t>23/02/2018</a:t>
+              <a:t>24/02/2018</a:t>
             </a:fld>
             <a:endParaRPr lang="es-ES"/>
           </a:p>
@@ -481,7 +481,7 @@
           <a:p>
             <a:fld id="{C947F3CF-587E-45B4-8FCF-EDFCE467AEF1}" type="datetimeFigureOut">
               <a:rPr lang="es-ES" smtClean="0"/>
-              <a:t>23/02/2018</a:t>
+              <a:t>24/02/2018</a:t>
             </a:fld>
             <a:endParaRPr lang="es-ES"/>
           </a:p>
@@ -689,7 +689,7 @@
           <a:p>
             <a:fld id="{C947F3CF-587E-45B4-8FCF-EDFCE467AEF1}" type="datetimeFigureOut">
               <a:rPr lang="es-ES" smtClean="0"/>
-              <a:t>23/02/2018</a:t>
+              <a:t>24/02/2018</a:t>
             </a:fld>
             <a:endParaRPr lang="es-ES"/>
           </a:p>
@@ -887,7 +887,7 @@
           <a:p>
             <a:fld id="{C947F3CF-587E-45B4-8FCF-EDFCE467AEF1}" type="datetimeFigureOut">
               <a:rPr lang="es-ES" smtClean="0"/>
-              <a:t>23/02/2018</a:t>
+              <a:t>24/02/2018</a:t>
             </a:fld>
             <a:endParaRPr lang="es-ES"/>
           </a:p>
@@ -1162,7 +1162,7 @@
           <a:p>
             <a:fld id="{C947F3CF-587E-45B4-8FCF-EDFCE467AEF1}" type="datetimeFigureOut">
               <a:rPr lang="es-ES" smtClean="0"/>
-              <a:t>23/02/2018</a:t>
+              <a:t>24/02/2018</a:t>
             </a:fld>
             <a:endParaRPr lang="es-ES"/>
           </a:p>
@@ -1427,7 +1427,7 @@
           <a:p>
             <a:fld id="{C947F3CF-587E-45B4-8FCF-EDFCE467AEF1}" type="datetimeFigureOut">
               <a:rPr lang="es-ES" smtClean="0"/>
-              <a:t>23/02/2018</a:t>
+              <a:t>24/02/2018</a:t>
             </a:fld>
             <a:endParaRPr lang="es-ES"/>
           </a:p>
@@ -1839,7 +1839,7 @@
           <a:p>
             <a:fld id="{C947F3CF-587E-45B4-8FCF-EDFCE467AEF1}" type="datetimeFigureOut">
               <a:rPr lang="es-ES" smtClean="0"/>
-              <a:t>23/02/2018</a:t>
+              <a:t>24/02/2018</a:t>
             </a:fld>
             <a:endParaRPr lang="es-ES"/>
           </a:p>
@@ -1980,7 +1980,7 @@
           <a:p>
             <a:fld id="{C947F3CF-587E-45B4-8FCF-EDFCE467AEF1}" type="datetimeFigureOut">
               <a:rPr lang="es-ES" smtClean="0"/>
-              <a:t>23/02/2018</a:t>
+              <a:t>24/02/2018</a:t>
             </a:fld>
             <a:endParaRPr lang="es-ES"/>
           </a:p>
@@ -2093,7 +2093,7 @@
           <a:p>
             <a:fld id="{C947F3CF-587E-45B4-8FCF-EDFCE467AEF1}" type="datetimeFigureOut">
               <a:rPr lang="es-ES" smtClean="0"/>
-              <a:t>23/02/2018</a:t>
+              <a:t>24/02/2018</a:t>
             </a:fld>
             <a:endParaRPr lang="es-ES"/>
           </a:p>
@@ -2404,7 +2404,7 @@
           <a:p>
             <a:fld id="{C947F3CF-587E-45B4-8FCF-EDFCE467AEF1}" type="datetimeFigureOut">
               <a:rPr lang="es-ES" smtClean="0"/>
-              <a:t>23/02/2018</a:t>
+              <a:t>24/02/2018</a:t>
             </a:fld>
             <a:endParaRPr lang="es-ES"/>
           </a:p>
@@ -2692,7 +2692,7 @@
           <a:p>
             <a:fld id="{C947F3CF-587E-45B4-8FCF-EDFCE467AEF1}" type="datetimeFigureOut">
               <a:rPr lang="es-ES" smtClean="0"/>
-              <a:t>23/02/2018</a:t>
+              <a:t>24/02/2018</a:t>
             </a:fld>
             <a:endParaRPr lang="es-ES"/>
           </a:p>
@@ -2933,7 +2933,7 @@
           <a:p>
             <a:fld id="{C947F3CF-587E-45B4-8FCF-EDFCE467AEF1}" type="datetimeFigureOut">
               <a:rPr lang="es-ES" smtClean="0"/>
-              <a:t>23/02/2018</a:t>
+              <a:t>24/02/2018</a:t>
             </a:fld>
             <a:endParaRPr lang="es-ES"/>
           </a:p>
@@ -5701,6 +5701,16 @@
           <a:p>
             <a:r>
               <a:rPr lang="es-ES" dirty="0"/>
+              <a:t>El objetivo general del Trabajo de Fin de Grado es integrar en el producto LUCA el concepto de </a:t>
+            </a:r>
+            <a:r>
+              <a:rPr lang="es-ES" i="1" dirty="0"/>
+              <a:t>Proceso</a:t>
+            </a:r>
+          </a:p>
+          <a:p>
+            <a:r>
+              <a:rPr lang="es-ES" dirty="0"/>
               <a:t>Realizado en CIC</a:t>
             </a:r>
           </a:p>

</xml_diff>

<commit_message>
boceto inicial de presentacion
guia de que decir en la presentacion
</commit_message>
<xml_diff>
--- a/presentacion/Presentació1.pptx
+++ b/presentacion/Presentació1.pptx
@@ -24,12 +24,11 @@
     <p:sldId id="273" r:id="rId18"/>
     <p:sldId id="266" r:id="rId19"/>
     <p:sldId id="274" r:id="rId20"/>
-    <p:sldId id="275" r:id="rId21"/>
-    <p:sldId id="276" r:id="rId22"/>
-    <p:sldId id="277" r:id="rId23"/>
-    <p:sldId id="278" r:id="rId24"/>
-    <p:sldId id="279" r:id="rId25"/>
-    <p:sldId id="280" r:id="rId26"/>
+    <p:sldId id="276" r:id="rId21"/>
+    <p:sldId id="277" r:id="rId22"/>
+    <p:sldId id="278" r:id="rId23"/>
+    <p:sldId id="279" r:id="rId24"/>
+    <p:sldId id="280" r:id="rId25"/>
   </p:sldIdLst>
   <p:sldSz cx="12192000" cy="6858000"/>
   <p:notesSz cx="6858000" cy="9144000"/>
@@ -4436,50 +4435,596 @@
             <p:ph type="title"/>
           </p:nvPr>
         </p:nvSpPr>
-        <p:spPr/>
-        <p:txBody>
-          <a:bodyPr/>
-          <a:lstStyle/>
-          <a:p>
-            <a:r>
-              <a:rPr lang="es-ES" dirty="0"/>
+        <p:spPr>
+          <a:xfrm>
+            <a:off x="838200" y="365125"/>
+            <a:ext cx="10515600" cy="1325563"/>
+          </a:xfrm>
+        </p:spPr>
+        <p:txBody>
+          <a:bodyPr/>
+          <a:lstStyle/>
+          <a:p>
+            <a:r>
+              <a:rPr lang="es-ES"/>
               <a:t>Negocio y Persistencia: JPA</a:t>
             </a:r>
-          </a:p>
-        </p:txBody>
-      </p:sp>
-      <p:sp>
-        <p:nvSpPr>
-          <p:cNvPr id="3" name="Marcador de contenido 2">
-            <a:extLst>
-              <a:ext uri="{FF2B5EF4-FFF2-40B4-BE49-F238E27FC236}">
-                <a16:creationId xmlns:a16="http://schemas.microsoft.com/office/drawing/2014/main" id="{4523B2AC-0BC9-4C72-819A-1342F12BF34A}"/>
-              </a:ext>
-            </a:extLst>
-          </p:cNvPr>
-          <p:cNvSpPr>
-            <a:spLocks noGrp="1"/>
-          </p:cNvSpPr>
-          <p:nvPr>
-            <p:ph idx="1"/>
-          </p:nvPr>
-        </p:nvSpPr>
-        <p:spPr/>
-        <p:txBody>
-          <a:bodyPr/>
-          <a:lstStyle/>
-          <a:p>
-            <a:r>
-              <a:rPr lang="es-ES" dirty="0"/>
-              <a:t>Código de como se comunica la app con </a:t>
-            </a:r>
-            <a:r>
-              <a:rPr lang="es-ES" dirty="0" err="1"/>
-              <a:t>jpa</a:t>
-            </a:r>
             <a:endParaRPr lang="es-ES" dirty="0"/>
           </a:p>
-          <a:p>
+        </p:txBody>
+      </p:sp>
+      <p:sp>
+        <p:nvSpPr>
+          <p:cNvPr id="14" name="Rectángulo 13">
+            <a:extLst>
+              <a:ext uri="{FF2B5EF4-FFF2-40B4-BE49-F238E27FC236}">
+                <a16:creationId xmlns:a16="http://schemas.microsoft.com/office/drawing/2014/main" id="{BDCB1635-E354-43D0-80D2-7927B2AED969}"/>
+              </a:ext>
+            </a:extLst>
+          </p:cNvPr>
+          <p:cNvSpPr/>
+          <p:nvPr/>
+        </p:nvSpPr>
+        <p:spPr>
+          <a:xfrm>
+            <a:off x="838200" y="2377089"/>
+            <a:ext cx="10796338" cy="3139321"/>
+          </a:xfrm>
+          <a:prstGeom prst="rect">
+            <a:avLst/>
+          </a:prstGeom>
+        </p:spPr>
+        <p:txBody>
+          <a:bodyPr wrap="square">
+            <a:spAutoFit/>
+          </a:bodyPr>
+          <a:lstStyle/>
+          <a:p>
+            <a:r>
+              <a:rPr lang="es-ES" dirty="0" err="1">
+                <a:solidFill>
+                  <a:srgbClr val="000000"/>
+                </a:solidFill>
+                <a:highlight>
+                  <a:srgbClr val="FFFFFF"/>
+                </a:highlight>
+                <a:latin typeface="Courier New" panose="02070309020205020404" pitchFamily="49" charset="0"/>
+              </a:rPr>
+              <a:t>public</a:t>
+            </a:r>
+            <a:r>
+              <a:rPr lang="es-ES" dirty="0">
+                <a:solidFill>
+                  <a:srgbClr val="000000"/>
+                </a:solidFill>
+                <a:highlight>
+                  <a:srgbClr val="FFFFFF"/>
+                </a:highlight>
+                <a:latin typeface="Courier New" panose="02070309020205020404" pitchFamily="49" charset="0"/>
+              </a:rPr>
+              <a:t> </a:t>
+            </a:r>
+            <a:r>
+              <a:rPr lang="es-ES" dirty="0" err="1">
+                <a:solidFill>
+                  <a:srgbClr val="000000"/>
+                </a:solidFill>
+                <a:highlight>
+                  <a:srgbClr val="FFFFFF"/>
+                </a:highlight>
+                <a:latin typeface="Courier New" panose="02070309020205020404" pitchFamily="49" charset="0"/>
+              </a:rPr>
+              <a:t>abstract</a:t>
+            </a:r>
+            <a:r>
+              <a:rPr lang="es-ES" dirty="0">
+                <a:solidFill>
+                  <a:srgbClr val="000000"/>
+                </a:solidFill>
+                <a:highlight>
+                  <a:srgbClr val="FFFFFF"/>
+                </a:highlight>
+                <a:latin typeface="Courier New" panose="02070309020205020404" pitchFamily="49" charset="0"/>
+              </a:rPr>
+              <a:t> </a:t>
+            </a:r>
+            <a:r>
+              <a:rPr lang="es-ES" dirty="0" err="1">
+                <a:solidFill>
+                  <a:srgbClr val="000000"/>
+                </a:solidFill>
+                <a:highlight>
+                  <a:srgbClr val="FFFFFF"/>
+                </a:highlight>
+                <a:latin typeface="Courier New" panose="02070309020205020404" pitchFamily="49" charset="0"/>
+              </a:rPr>
+              <a:t>class</a:t>
+            </a:r>
+            <a:r>
+              <a:rPr lang="es-ES" dirty="0">
+                <a:solidFill>
+                  <a:srgbClr val="000000"/>
+                </a:solidFill>
+                <a:highlight>
+                  <a:srgbClr val="FFFFFF"/>
+                </a:highlight>
+                <a:latin typeface="Courier New" panose="02070309020205020404" pitchFamily="49" charset="0"/>
+              </a:rPr>
+              <a:t> </a:t>
+            </a:r>
+            <a:r>
+              <a:rPr lang="es-ES" dirty="0" err="1">
+                <a:solidFill>
+                  <a:srgbClr val="000000"/>
+                </a:solidFill>
+                <a:highlight>
+                  <a:srgbClr val="FFFFFF"/>
+                </a:highlight>
+                <a:latin typeface="Courier New" panose="02070309020205020404" pitchFamily="49" charset="0"/>
+              </a:rPr>
+              <a:t>GenericRepositoryImpl</a:t>
+            </a:r>
+            <a:endParaRPr lang="es-ES" dirty="0">
+              <a:solidFill>
+                <a:srgbClr val="000000"/>
+              </a:solidFill>
+              <a:highlight>
+                <a:srgbClr val="FFFFFF"/>
+              </a:highlight>
+              <a:latin typeface="Courier New" panose="02070309020205020404" pitchFamily="49" charset="0"/>
+            </a:endParaRPr>
+          </a:p>
+          <a:p>
+            <a:r>
+              <a:rPr lang="es-ES" dirty="0">
+                <a:solidFill>
+                  <a:srgbClr val="000000"/>
+                </a:solidFill>
+                <a:highlight>
+                  <a:srgbClr val="FFFFFF"/>
+                </a:highlight>
+                <a:latin typeface="Courier New" panose="02070309020205020404" pitchFamily="49" charset="0"/>
+              </a:rPr>
+              <a:t>	&lt;T, F </a:t>
+            </a:r>
+            <a:r>
+              <a:rPr lang="es-ES" dirty="0" err="1">
+                <a:solidFill>
+                  <a:srgbClr val="000000"/>
+                </a:solidFill>
+                <a:highlight>
+                  <a:srgbClr val="FFFFFF"/>
+                </a:highlight>
+                <a:latin typeface="Courier New" panose="02070309020205020404" pitchFamily="49" charset="0"/>
+              </a:rPr>
+              <a:t>extends</a:t>
+            </a:r>
+            <a:r>
+              <a:rPr lang="es-ES" dirty="0">
+                <a:solidFill>
+                  <a:srgbClr val="000000"/>
+                </a:solidFill>
+                <a:highlight>
+                  <a:srgbClr val="FFFFFF"/>
+                </a:highlight>
+                <a:latin typeface="Courier New" panose="02070309020205020404" pitchFamily="49" charset="0"/>
+              </a:rPr>
+              <a:t> </a:t>
+            </a:r>
+            <a:r>
+              <a:rPr lang="es-ES" dirty="0" err="1">
+                <a:solidFill>
+                  <a:srgbClr val="000000"/>
+                </a:solidFill>
+                <a:highlight>
+                  <a:srgbClr val="FFFFFF"/>
+                </a:highlight>
+                <a:latin typeface="Courier New" panose="02070309020205020404" pitchFamily="49" charset="0"/>
+              </a:rPr>
+              <a:t>Filter</a:t>
+            </a:r>
+            <a:r>
+              <a:rPr lang="es-ES" dirty="0">
+                <a:solidFill>
+                  <a:srgbClr val="000000"/>
+                </a:solidFill>
+                <a:highlight>
+                  <a:srgbClr val="FFFFFF"/>
+                </a:highlight>
+                <a:latin typeface="Courier New" panose="02070309020205020404" pitchFamily="49" charset="0"/>
+              </a:rPr>
+              <a:t>, PK </a:t>
+            </a:r>
+            <a:r>
+              <a:rPr lang="es-ES" dirty="0" err="1">
+                <a:solidFill>
+                  <a:srgbClr val="000000"/>
+                </a:solidFill>
+                <a:highlight>
+                  <a:srgbClr val="FFFFFF"/>
+                </a:highlight>
+                <a:latin typeface="Courier New" panose="02070309020205020404" pitchFamily="49" charset="0"/>
+              </a:rPr>
+              <a:t>extends</a:t>
+            </a:r>
+            <a:r>
+              <a:rPr lang="es-ES" dirty="0">
+                <a:solidFill>
+                  <a:srgbClr val="000000"/>
+                </a:solidFill>
+                <a:highlight>
+                  <a:srgbClr val="FFFFFF"/>
+                </a:highlight>
+                <a:latin typeface="Courier New" panose="02070309020205020404" pitchFamily="49" charset="0"/>
+              </a:rPr>
+              <a:t> </a:t>
+            </a:r>
+            <a:r>
+              <a:rPr lang="es-ES" dirty="0" err="1">
+                <a:solidFill>
+                  <a:srgbClr val="000000"/>
+                </a:solidFill>
+                <a:highlight>
+                  <a:srgbClr val="FFFFFF"/>
+                </a:highlight>
+                <a:latin typeface="Courier New" panose="02070309020205020404" pitchFamily="49" charset="0"/>
+              </a:rPr>
+              <a:t>Serializable</a:t>
+            </a:r>
+            <a:r>
+              <a:rPr lang="es-ES" dirty="0">
+                <a:solidFill>
+                  <a:srgbClr val="000000"/>
+                </a:solidFill>
+                <a:highlight>
+                  <a:srgbClr val="FFFFFF"/>
+                </a:highlight>
+                <a:latin typeface="Courier New" panose="02070309020205020404" pitchFamily="49" charset="0"/>
+              </a:rPr>
+              <a:t>&gt;{</a:t>
+            </a:r>
+          </a:p>
+          <a:p>
+            <a:r>
+              <a:rPr lang="es-ES" dirty="0">
+                <a:solidFill>
+                  <a:srgbClr val="000000"/>
+                </a:solidFill>
+                <a:highlight>
+                  <a:srgbClr val="FFFFFF"/>
+                </a:highlight>
+                <a:latin typeface="Courier New" panose="02070309020205020404" pitchFamily="49" charset="0"/>
+              </a:rPr>
+              <a:t>	</a:t>
+            </a:r>
+          </a:p>
+          <a:p>
+            <a:r>
+              <a:rPr lang="es-ES" dirty="0">
+                <a:solidFill>
+                  <a:srgbClr val="000000"/>
+                </a:solidFill>
+                <a:highlight>
+                  <a:srgbClr val="FFFFFF"/>
+                </a:highlight>
+                <a:latin typeface="Courier New" panose="02070309020205020404" pitchFamily="49" charset="0"/>
+              </a:rPr>
+              <a:t>		@</a:t>
+            </a:r>
+            <a:r>
+              <a:rPr lang="es-ES" dirty="0" err="1">
+                <a:solidFill>
+                  <a:srgbClr val="000000"/>
+                </a:solidFill>
+                <a:highlight>
+                  <a:srgbClr val="FFFFFF"/>
+                </a:highlight>
+                <a:latin typeface="Courier New" panose="02070309020205020404" pitchFamily="49" charset="0"/>
+              </a:rPr>
+              <a:t>PersistenceContext</a:t>
+            </a:r>
+            <a:r>
+              <a:rPr lang="es-ES" dirty="0">
+                <a:solidFill>
+                  <a:srgbClr val="000000"/>
+                </a:solidFill>
+                <a:highlight>
+                  <a:srgbClr val="FFFFFF"/>
+                </a:highlight>
+                <a:latin typeface="Courier New" panose="02070309020205020404" pitchFamily="49" charset="0"/>
+              </a:rPr>
+              <a:t>(</a:t>
+            </a:r>
+            <a:r>
+              <a:rPr lang="es-ES" dirty="0" err="1">
+                <a:solidFill>
+                  <a:srgbClr val="000000"/>
+                </a:solidFill>
+                <a:highlight>
+                  <a:srgbClr val="FFFFFF"/>
+                </a:highlight>
+                <a:latin typeface="Courier New" panose="02070309020205020404" pitchFamily="49" charset="0"/>
+              </a:rPr>
+              <a:t>unitName</a:t>
+            </a:r>
+            <a:r>
+              <a:rPr lang="es-ES" dirty="0">
+                <a:solidFill>
+                  <a:srgbClr val="000000"/>
+                </a:solidFill>
+                <a:highlight>
+                  <a:srgbClr val="FFFFFF"/>
+                </a:highlight>
+                <a:latin typeface="Courier New" panose="02070309020205020404" pitchFamily="49" charset="0"/>
+              </a:rPr>
+              <a:t> = "</a:t>
+            </a:r>
+            <a:r>
+              <a:rPr lang="es-ES" dirty="0" err="1">
+                <a:solidFill>
+                  <a:srgbClr val="000000"/>
+                </a:solidFill>
+                <a:highlight>
+                  <a:srgbClr val="FFFFFF"/>
+                </a:highlight>
+                <a:latin typeface="Courier New" panose="02070309020205020404" pitchFamily="49" charset="0"/>
+              </a:rPr>
+              <a:t>persistence-unit</a:t>
+            </a:r>
+            <a:r>
+              <a:rPr lang="es-ES" dirty="0">
+                <a:solidFill>
+                  <a:srgbClr val="000000"/>
+                </a:solidFill>
+                <a:highlight>
+                  <a:srgbClr val="FFFFFF"/>
+                </a:highlight>
+                <a:latin typeface="Courier New" panose="02070309020205020404" pitchFamily="49" charset="0"/>
+              </a:rPr>
+              <a:t>")</a:t>
+            </a:r>
+          </a:p>
+          <a:p>
+            <a:r>
+              <a:rPr lang="es-ES" dirty="0">
+                <a:solidFill>
+                  <a:srgbClr val="000000"/>
+                </a:solidFill>
+                <a:highlight>
+                  <a:srgbClr val="FFFFFF"/>
+                </a:highlight>
+                <a:latin typeface="Courier New" panose="02070309020205020404" pitchFamily="49" charset="0"/>
+              </a:rPr>
+              <a:t>		</a:t>
+            </a:r>
+            <a:r>
+              <a:rPr lang="es-ES" dirty="0" err="1">
+                <a:solidFill>
+                  <a:srgbClr val="000000"/>
+                </a:solidFill>
+                <a:highlight>
+                  <a:srgbClr val="FFFFFF"/>
+                </a:highlight>
+                <a:latin typeface="Courier New" panose="02070309020205020404" pitchFamily="49" charset="0"/>
+              </a:rPr>
+              <a:t>protected</a:t>
+            </a:r>
+            <a:r>
+              <a:rPr lang="es-ES" dirty="0">
+                <a:solidFill>
+                  <a:srgbClr val="000000"/>
+                </a:solidFill>
+                <a:highlight>
+                  <a:srgbClr val="FFFFFF"/>
+                </a:highlight>
+                <a:latin typeface="Courier New" panose="02070309020205020404" pitchFamily="49" charset="0"/>
+              </a:rPr>
+              <a:t> </a:t>
+            </a:r>
+            <a:r>
+              <a:rPr lang="es-ES" dirty="0" err="1">
+                <a:solidFill>
+                  <a:srgbClr val="000000"/>
+                </a:solidFill>
+                <a:highlight>
+                  <a:srgbClr val="FFFFFF"/>
+                </a:highlight>
+                <a:latin typeface="Courier New" panose="02070309020205020404" pitchFamily="49" charset="0"/>
+              </a:rPr>
+              <a:t>EntityManager</a:t>
+            </a:r>
+            <a:r>
+              <a:rPr lang="es-ES" dirty="0">
+                <a:solidFill>
+                  <a:srgbClr val="000000"/>
+                </a:solidFill>
+                <a:highlight>
+                  <a:srgbClr val="FFFFFF"/>
+                </a:highlight>
+                <a:latin typeface="Courier New" panose="02070309020205020404" pitchFamily="49" charset="0"/>
+              </a:rPr>
+              <a:t> em;	</a:t>
+            </a:r>
+          </a:p>
+          <a:p>
+            <a:r>
+              <a:rPr lang="es-ES" dirty="0">
+                <a:solidFill>
+                  <a:srgbClr val="000000"/>
+                </a:solidFill>
+                <a:highlight>
+                  <a:srgbClr val="FFFFFF"/>
+                </a:highlight>
+                <a:latin typeface="Courier New" panose="02070309020205020404" pitchFamily="49" charset="0"/>
+              </a:rPr>
+              <a:t>		</a:t>
+            </a:r>
+          </a:p>
+          <a:p>
+            <a:r>
+              <a:rPr lang="en-US" dirty="0">
+                <a:solidFill>
+                  <a:srgbClr val="000000"/>
+                </a:solidFill>
+                <a:highlight>
+                  <a:srgbClr val="FFFFFF"/>
+                </a:highlight>
+                <a:latin typeface="Courier New" panose="02070309020205020404" pitchFamily="49" charset="0"/>
+              </a:rPr>
+              <a:t>		public T get(PK </a:t>
+            </a:r>
+            <a:r>
+              <a:rPr lang="en-US" dirty="0" err="1">
+                <a:solidFill>
+                  <a:srgbClr val="000000"/>
+                </a:solidFill>
+                <a:highlight>
+                  <a:srgbClr val="FFFFFF"/>
+                </a:highlight>
+                <a:latin typeface="Courier New" panose="02070309020205020404" pitchFamily="49" charset="0"/>
+              </a:rPr>
+              <a:t>pk</a:t>
+            </a:r>
+            <a:r>
+              <a:rPr lang="en-US" dirty="0">
+                <a:solidFill>
+                  <a:srgbClr val="000000"/>
+                </a:solidFill>
+                <a:highlight>
+                  <a:srgbClr val="FFFFFF"/>
+                </a:highlight>
+                <a:latin typeface="Courier New" panose="02070309020205020404" pitchFamily="49" charset="0"/>
+              </a:rPr>
+              <a:t>){	</a:t>
+            </a:r>
+          </a:p>
+          <a:p>
+            <a:r>
+              <a:rPr lang="en-US" dirty="0">
+                <a:solidFill>
+                  <a:srgbClr val="000000"/>
+                </a:solidFill>
+                <a:highlight>
+                  <a:srgbClr val="FFFFFF"/>
+                </a:highlight>
+                <a:latin typeface="Courier New" panose="02070309020205020404" pitchFamily="49" charset="0"/>
+              </a:rPr>
+              <a:t>			return </a:t>
+            </a:r>
+            <a:r>
+              <a:rPr lang="en-US" dirty="0" err="1">
+                <a:solidFill>
+                  <a:srgbClr val="000000"/>
+                </a:solidFill>
+                <a:highlight>
+                  <a:srgbClr val="FFFFFF"/>
+                </a:highlight>
+                <a:latin typeface="Courier New" panose="02070309020205020404" pitchFamily="49" charset="0"/>
+              </a:rPr>
+              <a:t>em.find</a:t>
+            </a:r>
+            <a:r>
+              <a:rPr lang="en-US" dirty="0">
+                <a:solidFill>
+                  <a:srgbClr val="000000"/>
+                </a:solidFill>
+                <a:highlight>
+                  <a:srgbClr val="FFFFFF"/>
+                </a:highlight>
+                <a:latin typeface="Courier New" panose="02070309020205020404" pitchFamily="49" charset="0"/>
+              </a:rPr>
+              <a:t>(</a:t>
+            </a:r>
+            <a:r>
+              <a:rPr lang="en-US" dirty="0" err="1">
+                <a:solidFill>
+                  <a:srgbClr val="000000"/>
+                </a:solidFill>
+                <a:highlight>
+                  <a:srgbClr val="FFFFFF"/>
+                </a:highlight>
+                <a:latin typeface="Courier New" panose="02070309020205020404" pitchFamily="49" charset="0"/>
+              </a:rPr>
+              <a:t>domainClass</a:t>
+            </a:r>
+            <a:r>
+              <a:rPr lang="en-US" dirty="0">
+                <a:solidFill>
+                  <a:srgbClr val="000000"/>
+                </a:solidFill>
+                <a:highlight>
+                  <a:srgbClr val="FFFFFF"/>
+                </a:highlight>
+                <a:latin typeface="Courier New" panose="02070309020205020404" pitchFamily="49" charset="0"/>
+              </a:rPr>
+              <a:t>, </a:t>
+            </a:r>
+            <a:r>
+              <a:rPr lang="en-US" dirty="0" err="1">
+                <a:solidFill>
+                  <a:srgbClr val="000000"/>
+                </a:solidFill>
+                <a:highlight>
+                  <a:srgbClr val="FFFFFF"/>
+                </a:highlight>
+                <a:latin typeface="Courier New" panose="02070309020205020404" pitchFamily="49" charset="0"/>
+              </a:rPr>
+              <a:t>pk</a:t>
+            </a:r>
+            <a:r>
+              <a:rPr lang="en-US" dirty="0">
+                <a:solidFill>
+                  <a:srgbClr val="000000"/>
+                </a:solidFill>
+                <a:highlight>
+                  <a:srgbClr val="FFFFFF"/>
+                </a:highlight>
+                <a:latin typeface="Courier New" panose="02070309020205020404" pitchFamily="49" charset="0"/>
+              </a:rPr>
+              <a:t>);</a:t>
+            </a:r>
+          </a:p>
+          <a:p>
+            <a:r>
+              <a:rPr lang="es-ES" dirty="0">
+                <a:solidFill>
+                  <a:srgbClr val="000000"/>
+                </a:solidFill>
+                <a:highlight>
+                  <a:srgbClr val="FFFFFF"/>
+                </a:highlight>
+                <a:latin typeface="Courier New" panose="02070309020205020404" pitchFamily="49" charset="0"/>
+              </a:rPr>
+              <a:t>		}</a:t>
+            </a:r>
+          </a:p>
+          <a:p>
+            <a:r>
+              <a:rPr lang="es-ES" dirty="0">
+                <a:solidFill>
+                  <a:srgbClr val="000000"/>
+                </a:solidFill>
+                <a:highlight>
+                  <a:srgbClr val="FFFFFF"/>
+                </a:highlight>
+                <a:latin typeface="Courier New" panose="02070309020205020404" pitchFamily="49" charset="0"/>
+              </a:rPr>
+              <a:t>}</a:t>
+            </a:r>
+          </a:p>
+          <a:p>
+            <a:r>
+              <a:rPr lang="es-ES" dirty="0">
+                <a:solidFill>
+                  <a:srgbClr val="000000"/>
+                </a:solidFill>
+                <a:highlight>
+                  <a:srgbClr val="FFFFFF"/>
+                </a:highlight>
+                <a:latin typeface="Courier New" panose="02070309020205020404" pitchFamily="49" charset="0"/>
+              </a:rPr>
+              <a:t>			</a:t>
+            </a:r>
             <a:endParaRPr lang="es-ES" dirty="0"/>
           </a:p>
         </p:txBody>
@@ -4763,7 +5308,7 @@
           <p:cNvPr id="2" name="Título 1">
             <a:extLst>
               <a:ext uri="{FF2B5EF4-FFF2-40B4-BE49-F238E27FC236}">
-                <a16:creationId xmlns:a16="http://schemas.microsoft.com/office/drawing/2014/main" id="{22C89AF3-54CA-433F-9A06-C2FBC298FFA1}"/>
+                <a16:creationId xmlns:a16="http://schemas.microsoft.com/office/drawing/2014/main" id="{C9287869-97B2-4EFC-B85D-0CB43C8B04A3}"/>
               </a:ext>
             </a:extLst>
           </p:cNvPr>
@@ -4779,7 +5324,10 @@
           <a:bodyPr/>
           <a:lstStyle/>
           <a:p>
-            <a:endParaRPr lang="es-ES"/>
+            <a:r>
+              <a:rPr lang="es-ES" dirty="0"/>
+              <a:t>Pruebas</a:t>
+            </a:r>
           </a:p>
         </p:txBody>
       </p:sp>
@@ -4788,7 +5336,7 @@
           <p:cNvPr id="3" name="Marcador de contenido 2">
             <a:extLst>
               <a:ext uri="{FF2B5EF4-FFF2-40B4-BE49-F238E27FC236}">
-                <a16:creationId xmlns:a16="http://schemas.microsoft.com/office/drawing/2014/main" id="{50F99617-E0DE-4E79-9230-AA204649BB56}"/>
+                <a16:creationId xmlns:a16="http://schemas.microsoft.com/office/drawing/2014/main" id="{7AF0E4CE-2A2B-4DAC-AC09-32FE0C4C3D09}"/>
               </a:ext>
             </a:extLst>
           </p:cNvPr>
@@ -4806,7 +5354,25 @@
           <a:p>
             <a:r>
               <a:rPr lang="es-ES" dirty="0"/>
-              <a:t>Video de ejecución y especificación de una consulta</a:t>
+              <a:t>Unitarias: JPA</a:t>
+            </a:r>
+          </a:p>
+          <a:p>
+            <a:r>
+              <a:rPr lang="es-ES" dirty="0"/>
+              <a:t>Editor gráfico.</a:t>
+            </a:r>
+          </a:p>
+          <a:p>
+            <a:r>
+              <a:rPr lang="es-ES" dirty="0"/>
+              <a:t>Componente genérico.</a:t>
+            </a:r>
+          </a:p>
+          <a:p>
+            <a:r>
+              <a:rPr lang="es-ES" dirty="0"/>
+              <a:t>Capa de Servicios de los Procesos: Automatizadas</a:t>
             </a:r>
           </a:p>
         </p:txBody>
@@ -4814,7 +5380,7 @@
     </p:spTree>
     <p:extLst>
       <p:ext uri="{BB962C8B-B14F-4D97-AF65-F5344CB8AC3E}">
-        <p14:creationId xmlns:p14="http://schemas.microsoft.com/office/powerpoint/2010/main" val="813389958"/>
+        <p14:creationId xmlns:p14="http://schemas.microsoft.com/office/powerpoint/2010/main" val="3136312610"/>
       </p:ext>
     </p:extLst>
   </p:cSld>
@@ -4846,7 +5412,7 @@
           <p:cNvPr id="2" name="Título 1">
             <a:extLst>
               <a:ext uri="{FF2B5EF4-FFF2-40B4-BE49-F238E27FC236}">
-                <a16:creationId xmlns:a16="http://schemas.microsoft.com/office/drawing/2014/main" id="{C9287869-97B2-4EFC-B85D-0CB43C8B04A3}"/>
+                <a16:creationId xmlns:a16="http://schemas.microsoft.com/office/drawing/2014/main" id="{AA4107EC-86B4-40CF-9A8E-A557F92F8A7B}"/>
               </a:ext>
             </a:extLst>
           </p:cNvPr>
@@ -4864,7 +5430,7 @@
           <a:p>
             <a:r>
               <a:rPr lang="es-ES" dirty="0"/>
-              <a:t>Pruebas</a:t>
+              <a:t>Sumario</a:t>
             </a:r>
           </a:p>
         </p:txBody>
@@ -4874,7 +5440,7 @@
           <p:cNvPr id="3" name="Marcador de contenido 2">
             <a:extLst>
               <a:ext uri="{FF2B5EF4-FFF2-40B4-BE49-F238E27FC236}">
-                <a16:creationId xmlns:a16="http://schemas.microsoft.com/office/drawing/2014/main" id="{7AF0E4CE-2A2B-4DAC-AC09-32FE0C4C3D09}"/>
+                <a16:creationId xmlns:a16="http://schemas.microsoft.com/office/drawing/2014/main" id="{BEBE750A-B8B7-48D8-9D83-3BD60F837129}"/>
               </a:ext>
             </a:extLst>
           </p:cNvPr>
@@ -4892,25 +5458,37 @@
           <a:p>
             <a:r>
               <a:rPr lang="es-ES" dirty="0"/>
-              <a:t>Unitarias: JPA</a:t>
-            </a:r>
-          </a:p>
-          <a:p>
-            <a:r>
-              <a:rPr lang="es-ES" dirty="0"/>
-              <a:t>Editor gráfico.</a:t>
-            </a:r>
-          </a:p>
-          <a:p>
-            <a:r>
-              <a:rPr lang="es-ES" dirty="0"/>
-              <a:t>Componente genérico.</a:t>
-            </a:r>
-          </a:p>
-          <a:p>
-            <a:r>
-              <a:rPr lang="es-ES" dirty="0"/>
-              <a:t>Capa de Servicios de los Procesos: Automatizadas</a:t>
+              <a:t>Especificación gráfica de procesos</a:t>
+            </a:r>
+          </a:p>
+          <a:p>
+            <a:r>
+              <a:rPr lang="es-ES" dirty="0"/>
+              <a:t>Alteración de la ejecución del flujo de ejecución de un proceso en función de los valores de las salidas. </a:t>
+            </a:r>
+          </a:p>
+          <a:p>
+            <a:r>
+              <a:rPr lang="es-ES" dirty="0"/>
+              <a:t>Comprobación de la corrección de la conexión entre salidas y entradas de las consultas que componen un proceso.</a:t>
+            </a:r>
+          </a:p>
+          <a:p>
+            <a:r>
+              <a:rPr lang="es-ES" dirty="0"/>
+              <a:t>Ejecución de procesos.</a:t>
+            </a:r>
+          </a:p>
+          <a:p>
+            <a:r>
+              <a:rPr lang="es-ES" dirty="0"/>
+              <a:t>Ejecución paso a paso de los procesos.</a:t>
+            </a:r>
+          </a:p>
+          <a:p>
+            <a:r>
+              <a:rPr lang="es-ES" dirty="0"/>
+              <a:t>Exportar los resultados de los procesos.</a:t>
             </a:r>
           </a:p>
         </p:txBody>
@@ -4918,7 +5496,7 @@
     </p:spTree>
     <p:extLst>
       <p:ext uri="{BB962C8B-B14F-4D97-AF65-F5344CB8AC3E}">
-        <p14:creationId xmlns:p14="http://schemas.microsoft.com/office/powerpoint/2010/main" val="3136312610"/>
+        <p14:creationId xmlns:p14="http://schemas.microsoft.com/office/powerpoint/2010/main" val="118922523"/>
       </p:ext>
     </p:extLst>
   </p:cSld>
@@ -4950,7 +5528,7 @@
           <p:cNvPr id="2" name="Título 1">
             <a:extLst>
               <a:ext uri="{FF2B5EF4-FFF2-40B4-BE49-F238E27FC236}">
-                <a16:creationId xmlns:a16="http://schemas.microsoft.com/office/drawing/2014/main" id="{AA4107EC-86B4-40CF-9A8E-A557F92F8A7B}"/>
+                <a16:creationId xmlns:a16="http://schemas.microsoft.com/office/drawing/2014/main" id="{13328307-CD47-45FC-AC83-6B897F518210}"/>
               </a:ext>
             </a:extLst>
           </p:cNvPr>
@@ -4968,7 +5546,7 @@
           <a:p>
             <a:r>
               <a:rPr lang="es-ES" dirty="0"/>
-              <a:t>Sumario</a:t>
+              <a:t>Experiencia Personal</a:t>
             </a:r>
           </a:p>
         </p:txBody>
@@ -4978,7 +5556,7 @@
           <p:cNvPr id="3" name="Marcador de contenido 2">
             <a:extLst>
               <a:ext uri="{FF2B5EF4-FFF2-40B4-BE49-F238E27FC236}">
-                <a16:creationId xmlns:a16="http://schemas.microsoft.com/office/drawing/2014/main" id="{BEBE750A-B8B7-48D8-9D83-3BD60F837129}"/>
+                <a16:creationId xmlns:a16="http://schemas.microsoft.com/office/drawing/2014/main" id="{185103BB-2019-4C7B-BBC7-353C72AF3954}"/>
               </a:ext>
             </a:extLst>
           </p:cNvPr>
@@ -4996,37 +5574,39 @@
           <a:p>
             <a:r>
               <a:rPr lang="es-ES" dirty="0"/>
-              <a:t>Especificación gráfica de procesos</a:t>
-            </a:r>
-          </a:p>
-          <a:p>
-            <a:r>
-              <a:rPr lang="es-ES" dirty="0"/>
-              <a:t>Alteración de la ejecución del flujo de ejecución de un proceso en función de los valores de las salidas. </a:t>
-            </a:r>
-          </a:p>
-          <a:p>
-            <a:r>
-              <a:rPr lang="es-ES" dirty="0"/>
-              <a:t>Comprobación de la corrección de la conexión entre salidas y entradas de las consultas que componen un proceso.</a:t>
-            </a:r>
-          </a:p>
-          <a:p>
-            <a:r>
-              <a:rPr lang="es-ES" dirty="0"/>
-              <a:t>Ejecución de procesos.</a:t>
-            </a:r>
-          </a:p>
-          <a:p>
-            <a:r>
-              <a:rPr lang="es-ES" dirty="0"/>
-              <a:t>Ejecución paso a paso de los procesos.</a:t>
-            </a:r>
-          </a:p>
-          <a:p>
-            <a:r>
-              <a:rPr lang="es-ES" dirty="0"/>
-              <a:t>Exportar los resultados de los procesos.</a:t>
+              <a:t>Experiencia muy satisfactoria.</a:t>
+            </a:r>
+          </a:p>
+          <a:p>
+            <a:r>
+              <a:rPr lang="es-ES" dirty="0"/>
+              <a:t>Aprender nuevos </a:t>
+            </a:r>
+            <a:r>
+              <a:rPr lang="es-ES" dirty="0" err="1"/>
+              <a:t>frameworks</a:t>
+            </a:r>
+            <a:r>
+              <a:rPr lang="es-ES" dirty="0"/>
+              <a:t> y tecnologías.</a:t>
+            </a:r>
+          </a:p>
+          <a:p>
+            <a:r>
+              <a:rPr lang="es-ES" dirty="0"/>
+              <a:t>Fijación a horarios y responsabilidades.</a:t>
+            </a:r>
+          </a:p>
+          <a:p>
+            <a:r>
+              <a:rPr lang="es-ES" dirty="0"/>
+              <a:t>Gran oportunidad de trabajo en la empresa CIC.</a:t>
+            </a:r>
+          </a:p>
+          <a:p>
+            <a:r>
+              <a:rPr lang="es-ES" dirty="0"/>
+              <a:t>Continuidad en CIC.</a:t>
             </a:r>
           </a:p>
         </p:txBody>
@@ -5034,7 +5614,7 @@
     </p:spTree>
     <p:extLst>
       <p:ext uri="{BB962C8B-B14F-4D97-AF65-F5344CB8AC3E}">
-        <p14:creationId xmlns:p14="http://schemas.microsoft.com/office/powerpoint/2010/main" val="118922523"/>
+        <p14:creationId xmlns:p14="http://schemas.microsoft.com/office/powerpoint/2010/main" val="601501182"/>
       </p:ext>
     </p:extLst>
   </p:cSld>
@@ -5066,124 +5646,6 @@
           <p:cNvPr id="2" name="Título 1">
             <a:extLst>
               <a:ext uri="{FF2B5EF4-FFF2-40B4-BE49-F238E27FC236}">
-                <a16:creationId xmlns:a16="http://schemas.microsoft.com/office/drawing/2014/main" id="{13328307-CD47-45FC-AC83-6B897F518210}"/>
-              </a:ext>
-            </a:extLst>
-          </p:cNvPr>
-          <p:cNvSpPr>
-            <a:spLocks noGrp="1"/>
-          </p:cNvSpPr>
-          <p:nvPr>
-            <p:ph type="title"/>
-          </p:nvPr>
-        </p:nvSpPr>
-        <p:spPr/>
-        <p:txBody>
-          <a:bodyPr/>
-          <a:lstStyle/>
-          <a:p>
-            <a:r>
-              <a:rPr lang="es-ES" dirty="0"/>
-              <a:t>Experiencia Personal</a:t>
-            </a:r>
-          </a:p>
-        </p:txBody>
-      </p:sp>
-      <p:sp>
-        <p:nvSpPr>
-          <p:cNvPr id="3" name="Marcador de contenido 2">
-            <a:extLst>
-              <a:ext uri="{FF2B5EF4-FFF2-40B4-BE49-F238E27FC236}">
-                <a16:creationId xmlns:a16="http://schemas.microsoft.com/office/drawing/2014/main" id="{185103BB-2019-4C7B-BBC7-353C72AF3954}"/>
-              </a:ext>
-            </a:extLst>
-          </p:cNvPr>
-          <p:cNvSpPr>
-            <a:spLocks noGrp="1"/>
-          </p:cNvSpPr>
-          <p:nvPr>
-            <p:ph idx="1"/>
-          </p:nvPr>
-        </p:nvSpPr>
-        <p:spPr/>
-        <p:txBody>
-          <a:bodyPr/>
-          <a:lstStyle/>
-          <a:p>
-            <a:r>
-              <a:rPr lang="es-ES" dirty="0"/>
-              <a:t>Experiencia muy satisfactoria.</a:t>
-            </a:r>
-          </a:p>
-          <a:p>
-            <a:r>
-              <a:rPr lang="es-ES" dirty="0"/>
-              <a:t>Aprender nuevos </a:t>
-            </a:r>
-            <a:r>
-              <a:rPr lang="es-ES" dirty="0" err="1"/>
-              <a:t>frameworks</a:t>
-            </a:r>
-            <a:r>
-              <a:rPr lang="es-ES" dirty="0"/>
-              <a:t> y tecnologías.</a:t>
-            </a:r>
-          </a:p>
-          <a:p>
-            <a:r>
-              <a:rPr lang="es-ES" dirty="0"/>
-              <a:t>Fijación a horarios y responsabilidades.</a:t>
-            </a:r>
-          </a:p>
-          <a:p>
-            <a:r>
-              <a:rPr lang="es-ES" dirty="0"/>
-              <a:t>Gran oportunidad de trabajo en la empresa CIC.</a:t>
-            </a:r>
-          </a:p>
-          <a:p>
-            <a:r>
-              <a:rPr lang="es-ES" dirty="0"/>
-              <a:t>Continuidad en CIC.</a:t>
-            </a:r>
-          </a:p>
-        </p:txBody>
-      </p:sp>
-    </p:spTree>
-    <p:extLst>
-      <p:ext uri="{BB962C8B-B14F-4D97-AF65-F5344CB8AC3E}">
-        <p14:creationId xmlns:p14="http://schemas.microsoft.com/office/powerpoint/2010/main" val="601501182"/>
-      </p:ext>
-    </p:extLst>
-  </p:cSld>
-  <p:clrMapOvr>
-    <a:masterClrMapping/>
-  </p:clrMapOvr>
-</p:sld>
-</file>
-
-<file path=ppt/slides/slide24.xml><?xml version="1.0" encoding="utf-8"?>
-<p:sld xmlns:a="http://schemas.openxmlformats.org/drawingml/2006/main" xmlns:r="http://schemas.openxmlformats.org/officeDocument/2006/relationships" xmlns:p="http://schemas.openxmlformats.org/presentationml/2006/main">
-  <p:cSld>
-    <p:spTree>
-      <p:nvGrpSpPr>
-        <p:cNvPr id="1" name=""/>
-        <p:cNvGrpSpPr/>
-        <p:nvPr/>
-      </p:nvGrpSpPr>
-      <p:grpSpPr>
-        <a:xfrm>
-          <a:off x="0" y="0"/>
-          <a:ext cx="0" cy="0"/>
-          <a:chOff x="0" y="0"/>
-          <a:chExt cx="0" cy="0"/>
-        </a:xfrm>
-      </p:grpSpPr>
-      <p:sp>
-        <p:nvSpPr>
-          <p:cNvPr id="2" name="Título 1">
-            <a:extLst>
-              <a:ext uri="{FF2B5EF4-FFF2-40B4-BE49-F238E27FC236}">
                 <a16:creationId xmlns:a16="http://schemas.microsoft.com/office/drawing/2014/main" id="{D11F44C8-6E64-4275-A153-584A50C097BC}"/>
               </a:ext>
             </a:extLst>
@@ -5252,7 +5714,7 @@
 </p:sld>
 </file>
 
-<file path=ppt/slides/slide25.xml><?xml version="1.0" encoding="utf-8"?>
+<file path=ppt/slides/slide24.xml><?xml version="1.0" encoding="utf-8"?>
 <p:sld xmlns:a="http://schemas.openxmlformats.org/drawingml/2006/main" xmlns:r="http://schemas.openxmlformats.org/officeDocument/2006/relationships" xmlns:p="http://schemas.openxmlformats.org/presentationml/2006/main">
   <p:cSld>
     <p:spTree>

</xml_diff>

<commit_message>
insertada imagen de motivacion
proyecto de photoshop pasra motivacion
</commit_message>
<xml_diff>
--- a/presentacion/Presentació1.pptx
+++ b/presentacion/Presentació1.pptx
@@ -282,7 +282,7 @@
           <a:p>
             <a:fld id="{C947F3CF-587E-45B4-8FCF-EDFCE467AEF1}" type="datetimeFigureOut">
               <a:rPr lang="es-ES" smtClean="0"/>
-              <a:t>24/02/2018</a:t>
+              <a:t>25/02/2018</a:t>
             </a:fld>
             <a:endParaRPr lang="es-ES"/>
           </a:p>
@@ -480,7 +480,7 @@
           <a:p>
             <a:fld id="{C947F3CF-587E-45B4-8FCF-EDFCE467AEF1}" type="datetimeFigureOut">
               <a:rPr lang="es-ES" smtClean="0"/>
-              <a:t>24/02/2018</a:t>
+              <a:t>25/02/2018</a:t>
             </a:fld>
             <a:endParaRPr lang="es-ES"/>
           </a:p>
@@ -688,7 +688,7 @@
           <a:p>
             <a:fld id="{C947F3CF-587E-45B4-8FCF-EDFCE467AEF1}" type="datetimeFigureOut">
               <a:rPr lang="es-ES" smtClean="0"/>
-              <a:t>24/02/2018</a:t>
+              <a:t>25/02/2018</a:t>
             </a:fld>
             <a:endParaRPr lang="es-ES"/>
           </a:p>
@@ -886,7 +886,7 @@
           <a:p>
             <a:fld id="{C947F3CF-587E-45B4-8FCF-EDFCE467AEF1}" type="datetimeFigureOut">
               <a:rPr lang="es-ES" smtClean="0"/>
-              <a:t>24/02/2018</a:t>
+              <a:t>25/02/2018</a:t>
             </a:fld>
             <a:endParaRPr lang="es-ES"/>
           </a:p>
@@ -1161,7 +1161,7 @@
           <a:p>
             <a:fld id="{C947F3CF-587E-45B4-8FCF-EDFCE467AEF1}" type="datetimeFigureOut">
               <a:rPr lang="es-ES" smtClean="0"/>
-              <a:t>24/02/2018</a:t>
+              <a:t>25/02/2018</a:t>
             </a:fld>
             <a:endParaRPr lang="es-ES"/>
           </a:p>
@@ -1426,7 +1426,7 @@
           <a:p>
             <a:fld id="{C947F3CF-587E-45B4-8FCF-EDFCE467AEF1}" type="datetimeFigureOut">
               <a:rPr lang="es-ES" smtClean="0"/>
-              <a:t>24/02/2018</a:t>
+              <a:t>25/02/2018</a:t>
             </a:fld>
             <a:endParaRPr lang="es-ES"/>
           </a:p>
@@ -1838,7 +1838,7 @@
           <a:p>
             <a:fld id="{C947F3CF-587E-45B4-8FCF-EDFCE467AEF1}" type="datetimeFigureOut">
               <a:rPr lang="es-ES" smtClean="0"/>
-              <a:t>24/02/2018</a:t>
+              <a:t>25/02/2018</a:t>
             </a:fld>
             <a:endParaRPr lang="es-ES"/>
           </a:p>
@@ -1979,7 +1979,7 @@
           <a:p>
             <a:fld id="{C947F3CF-587E-45B4-8FCF-EDFCE467AEF1}" type="datetimeFigureOut">
               <a:rPr lang="es-ES" smtClean="0"/>
-              <a:t>24/02/2018</a:t>
+              <a:t>25/02/2018</a:t>
             </a:fld>
             <a:endParaRPr lang="es-ES"/>
           </a:p>
@@ -2092,7 +2092,7 @@
           <a:p>
             <a:fld id="{C947F3CF-587E-45B4-8FCF-EDFCE467AEF1}" type="datetimeFigureOut">
               <a:rPr lang="es-ES" smtClean="0"/>
-              <a:t>24/02/2018</a:t>
+              <a:t>25/02/2018</a:t>
             </a:fld>
             <a:endParaRPr lang="es-ES"/>
           </a:p>
@@ -2403,7 +2403,7 @@
           <a:p>
             <a:fld id="{C947F3CF-587E-45B4-8FCF-EDFCE467AEF1}" type="datetimeFigureOut">
               <a:rPr lang="es-ES" smtClean="0"/>
-              <a:t>24/02/2018</a:t>
+              <a:t>25/02/2018</a:t>
             </a:fld>
             <a:endParaRPr lang="es-ES"/>
           </a:p>
@@ -2691,7 +2691,7 @@
           <a:p>
             <a:fld id="{C947F3CF-587E-45B4-8FCF-EDFCE467AEF1}" type="datetimeFigureOut">
               <a:rPr lang="es-ES" smtClean="0"/>
-              <a:t>24/02/2018</a:t>
+              <a:t>25/02/2018</a:t>
             </a:fld>
             <a:endParaRPr lang="es-ES"/>
           </a:p>
@@ -2932,7 +2932,7 @@
           <a:p>
             <a:fld id="{C947F3CF-587E-45B4-8FCF-EDFCE467AEF1}" type="datetimeFigureOut">
               <a:rPr lang="es-ES" smtClean="0"/>
-              <a:t>24/02/2018</a:t>
+              <a:t>25/02/2018</a:t>
             </a:fld>
             <a:endParaRPr lang="es-ES"/>
           </a:p>
@@ -6413,46 +6413,59 @@
             <p:ph type="title"/>
           </p:nvPr>
         </p:nvSpPr>
-        <p:spPr/>
-        <p:txBody>
-          <a:bodyPr/>
-          <a:lstStyle/>
-          <a:p>
-            <a:r>
-              <a:rPr lang="es-ES" dirty="0"/>
+        <p:spPr>
+          <a:xfrm>
+            <a:off x="838200" y="365125"/>
+            <a:ext cx="10515600" cy="1325563"/>
+          </a:xfrm>
+        </p:spPr>
+        <p:txBody>
+          <a:bodyPr/>
+          <a:lstStyle/>
+          <a:p>
+            <a:r>
+              <a:rPr lang="es-ES"/>
               <a:t>Motivación</a:t>
             </a:r>
-          </a:p>
-        </p:txBody>
-      </p:sp>
-      <p:sp>
-        <p:nvSpPr>
-          <p:cNvPr id="3" name="Marcador de contenido 2">
-            <a:extLst>
-              <a:ext uri="{FF2B5EF4-FFF2-40B4-BE49-F238E27FC236}">
-                <a16:creationId xmlns:a16="http://schemas.microsoft.com/office/drawing/2014/main" id="{5A1E0768-DCC3-43BE-B717-670C448A012D}"/>
-              </a:ext>
-            </a:extLst>
-          </p:cNvPr>
-          <p:cNvSpPr>
-            <a:spLocks noGrp="1"/>
-          </p:cNvSpPr>
-          <p:nvPr>
-            <p:ph idx="1"/>
-          </p:nvPr>
-        </p:nvSpPr>
-        <p:spPr/>
-        <p:txBody>
-          <a:bodyPr/>
-          <a:lstStyle/>
-          <a:p>
-            <a:r>
-              <a:rPr lang="es-ES" dirty="0"/>
-              <a:t>Imagen de interacción del usuario para hacer un proceso</a:t>
-            </a:r>
-          </a:p>
-        </p:txBody>
-      </p:sp>
+            <a:endParaRPr lang="es-ES" dirty="0"/>
+          </a:p>
+        </p:txBody>
+      </p:sp>
+      <p:pic>
+        <p:nvPicPr>
+          <p:cNvPr id="5" name="Imagen 4">
+            <a:extLst>
+              <a:ext uri="{FF2B5EF4-FFF2-40B4-BE49-F238E27FC236}">
+                <a16:creationId xmlns:a16="http://schemas.microsoft.com/office/drawing/2014/main" id="{879FA615-FEA3-4599-BE48-ACDFB018DA2C}"/>
+              </a:ext>
+            </a:extLst>
+          </p:cNvPr>
+          <p:cNvPicPr>
+            <a:picLocks noChangeAspect="1"/>
+          </p:cNvPicPr>
+          <p:nvPr/>
+        </p:nvPicPr>
+        <p:blipFill rotWithShape="1">
+          <a:blip r:embed="rId2">
+            <a:extLst>
+              <a:ext uri="{28A0092B-C50C-407E-A947-70E740481C1C}">
+                <a14:useLocalDpi xmlns:a14="http://schemas.microsoft.com/office/drawing/2010/main" val="0"/>
+              </a:ext>
+            </a:extLst>
+          </a:blip>
+          <a:srcRect l="4649" t="2835" r="9365" b="19751"/>
+          <a:stretch/>
+        </p:blipFill>
+        <p:spPr>
+          <a:xfrm>
+            <a:off x="3247053" y="1259633"/>
+            <a:ext cx="5896947" cy="5309118"/>
+          </a:xfrm>
+          <a:prstGeom prst="rect">
+            <a:avLst/>
+          </a:prstGeom>
+        </p:spPr>
+      </p:pic>
     </p:spTree>
     <p:extLst>
       <p:ext uri="{BB962C8B-B14F-4D97-AF65-F5344CB8AC3E}">

</xml_diff>